<commit_message>
setup for env to run a set of tracks and improved reward
rewards scaled relative to if race was better than "best for this track" in env
env now accepts a dict of tracks, and select one at random for each episode
env tracks best time yet achieved for each "track" in env
</commit_message>
<xml_diff>
--- a/supercross_learner/supercross_project_readme.pptx
+++ b/supercross_learner/supercross_project_readme.pptx
@@ -9,16 +9,17 @@
     <p:sldId id="272" r:id="rId3"/>
     <p:sldId id="256" r:id="rId4"/>
     <p:sldId id="271" r:id="rId5"/>
-    <p:sldId id="257" r:id="rId6"/>
-    <p:sldId id="261" r:id="rId7"/>
-    <p:sldId id="273" r:id="rId8"/>
-    <p:sldId id="260" r:id="rId9"/>
-    <p:sldId id="264" r:id="rId10"/>
-    <p:sldId id="265" r:id="rId11"/>
-    <p:sldId id="267" r:id="rId12"/>
-    <p:sldId id="268" r:id="rId13"/>
-    <p:sldId id="274" r:id="rId14"/>
-    <p:sldId id="266" r:id="rId15"/>
+    <p:sldId id="275" r:id="rId6"/>
+    <p:sldId id="257" r:id="rId7"/>
+    <p:sldId id="261" r:id="rId8"/>
+    <p:sldId id="273" r:id="rId9"/>
+    <p:sldId id="260" r:id="rId10"/>
+    <p:sldId id="264" r:id="rId11"/>
+    <p:sldId id="265" r:id="rId12"/>
+    <p:sldId id="267" r:id="rId13"/>
+    <p:sldId id="268" r:id="rId14"/>
+    <p:sldId id="274" r:id="rId15"/>
+    <p:sldId id="266" r:id="rId16"/>
   </p:sldIdLst>
   <p:sldSz cx="12192000" cy="6858000"/>
   <p:notesSz cx="6858000" cy="9144000"/>
@@ -3579,7 +3580,7 @@
         </p:nvSpPr>
         <p:spPr>
           <a:xfrm>
-            <a:off x="123041" y="815974"/>
+            <a:off x="123041" y="760556"/>
             <a:ext cx="10515600" cy="4351338"/>
           </a:xfrm>
         </p:spPr>
@@ -3611,15 +3612,7 @@
           <a:p>
             <a:r>
               <a:rPr lang="en-US" sz="1200" dirty="0"/>
-              <a:t>We can see the trend towards more full throttle, shorter episode time, and monotonic </a:t>
-            </a:r>
-            <a:r>
-              <a:rPr lang="en-US" sz="1200" dirty="0" err="1"/>
-              <a:t>Xpos</a:t>
-            </a:r>
-            <a:r>
-              <a:rPr lang="en-US" sz="1200" dirty="0"/>
-              <a:t> increase over episode (i.e. no rolling back down jump face)</a:t>
+              <a:t>We can see the trend towards more full throttle, not rolling backwards on jump face. Still some ambiguity with what to do at start. Obviously because it only see 30m ahead, and 30m ahead of start there is nothing. But what's nice about that is we see that as soon as it does see a feature like jump face, high throttle actions predominate.</a:t>
             </a:r>
           </a:p>
           <a:p>
@@ -3644,10 +3637,10 @@
       </p:sp>
       <p:pic>
         <p:nvPicPr>
-          <p:cNvPr id="4" name="Picture 3">
-            <a:extLst>
-              <a:ext uri="{FF2B5EF4-FFF2-40B4-BE49-F238E27FC236}">
-                <a16:creationId xmlns:a16="http://schemas.microsoft.com/office/drawing/2014/main" id="{02176ADC-38E6-4CC8-B6B5-F5829B28C57A}"/>
+          <p:cNvPr id="5" name="Picture 4">
+            <a:extLst>
+              <a:ext uri="{FF2B5EF4-FFF2-40B4-BE49-F238E27FC236}">
+                <a16:creationId xmlns:a16="http://schemas.microsoft.com/office/drawing/2014/main" id="{53A80669-8EDD-4B2B-B6DE-09D9114F95E3}"/>
               </a:ext>
             </a:extLst>
           </p:cNvPr>
@@ -3664,8 +3657,8 @@
         </p:blipFill>
         <p:spPr>
           <a:xfrm>
-            <a:off x="2391362" y="1690687"/>
-            <a:ext cx="9800637" cy="5088283"/>
+            <a:off x="2296885" y="1764380"/>
+            <a:ext cx="9895115" cy="5093620"/>
           </a:xfrm>
           <a:prstGeom prst="rect">
             <a:avLst/>
@@ -3675,7 +3668,7 @@
     </p:spTree>
     <p:extLst>
       <p:ext uri="{BB962C8B-B14F-4D97-AF65-F5344CB8AC3E}">
-        <p14:creationId xmlns:p14="http://schemas.microsoft.com/office/powerpoint/2010/main" val="1348317461"/>
+        <p14:creationId xmlns:p14="http://schemas.microsoft.com/office/powerpoint/2010/main" val="2794760790"/>
       </p:ext>
     </p:extLst>
   </p:cSld>
@@ -3704,10 +3697,48 @@
       </p:grpSpPr>
       <p:sp>
         <p:nvSpPr>
+          <p:cNvPr id="2" name="Title 1">
+            <a:extLst>
+              <a:ext uri="{FF2B5EF4-FFF2-40B4-BE49-F238E27FC236}">
+                <a16:creationId xmlns:a16="http://schemas.microsoft.com/office/drawing/2014/main" id="{A694CACF-DA40-4BB6-86BE-61D735641D6A}"/>
+              </a:ext>
+            </a:extLst>
+          </p:cNvPr>
+          <p:cNvSpPr>
+            <a:spLocks noGrp="1"/>
+          </p:cNvSpPr>
+          <p:nvPr>
+            <p:ph type="title"/>
+          </p:nvPr>
+        </p:nvSpPr>
+        <p:spPr>
+          <a:xfrm>
+            <a:off x="0" y="-115434"/>
+            <a:ext cx="10515600" cy="1325563"/>
+          </a:xfrm>
+        </p:spPr>
+        <p:txBody>
+          <a:bodyPr/>
+          <a:lstStyle/>
+          <a:p>
+            <a:r>
+              <a:rPr lang="en-US" dirty="0"/>
+              <a:t>First success with </a:t>
+            </a:r>
+            <a:r>
+              <a:rPr lang="en-US" dirty="0" err="1"/>
+              <a:t>tensorForce</a:t>
+            </a:r>
+            <a:endParaRPr lang="en-US" dirty="0"/>
+          </a:p>
+        </p:txBody>
+      </p:sp>
+      <p:sp>
+        <p:nvSpPr>
           <p:cNvPr id="3" name="Content Placeholder 2">
             <a:extLst>
               <a:ext uri="{FF2B5EF4-FFF2-40B4-BE49-F238E27FC236}">
-                <a16:creationId xmlns:a16="http://schemas.microsoft.com/office/drawing/2014/main" id="{EFB31903-0DEC-4695-A1E1-9EC4AAA7BE3B}"/>
+                <a16:creationId xmlns:a16="http://schemas.microsoft.com/office/drawing/2014/main" id="{B63D27CD-0D37-4F82-82F3-86DA6C78278E}"/>
               </a:ext>
             </a:extLst>
           </p:cNvPr>
@@ -3720,39 +3751,66 @@
         </p:nvSpPr>
         <p:spPr>
           <a:xfrm>
-            <a:off x="157018" y="147782"/>
-            <a:ext cx="11196782" cy="6029181"/>
-          </a:xfrm>
-        </p:spPr>
-        <p:txBody>
-          <a:bodyPr/>
-          <a:lstStyle/>
-          <a:p>
-            <a:r>
-              <a:rPr lang="en-US" dirty="0"/>
-              <a:t>Shortened mk_trk1 starting flat section to be closer to agent look ahead distance, and this might be the cause of the almost no learning for that test</a:t>
-            </a:r>
-          </a:p>
-          <a:p>
-            <a:r>
-              <a:rPr lang="en-US" dirty="0"/>
-              <a:t>Order of figures: Ep3000</a:t>
-            </a:r>
-            <a:r>
-              <a:rPr lang="en-US" dirty="0">
-                <a:sym typeface="Wingdings" panose="05000000000000000000" pitchFamily="2" charset="2"/>
-              </a:rPr>
-              <a:t>ep1</a:t>
-            </a:r>
-          </a:p>
-          <a:p>
-            <a:r>
-              <a:rPr lang="en-US" dirty="0">
-                <a:sym typeface="Wingdings" panose="05000000000000000000" pitchFamily="2" charset="2"/>
-              </a:rPr>
-              <a:t>Why is this? I think it could be because learning is a stochastic process, due the random element of the explore/exploit process, which means running the same experiment twice will not result in the same learning rate. So maybe this was just a bad experiment in terms of global learning rate (i.e. how much better agent gets over 300 episodes).</a:t>
-            </a:r>
-            <a:endParaRPr lang="en-US" dirty="0"/>
+            <a:off x="123041" y="815974"/>
+            <a:ext cx="10515600" cy="4351338"/>
+          </a:xfrm>
+        </p:spPr>
+        <p:txBody>
+          <a:bodyPr>
+            <a:normAutofit/>
+          </a:bodyPr>
+          <a:lstStyle/>
+          <a:p>
+            <a:r>
+              <a:rPr lang="en-US" sz="1200" dirty="0"/>
+              <a:t>Uses default PPO agent from </a:t>
+            </a:r>
+            <a:r>
+              <a:rPr lang="en-US" sz="1200" dirty="0" err="1"/>
+              <a:t>OpenAI</a:t>
+            </a:r>
+            <a:r>
+              <a:rPr lang="en-US" sz="1200" dirty="0"/>
+              <a:t> gym Cart Pole example.</a:t>
+            </a:r>
+          </a:p>
+          <a:p>
+            <a:r>
+              <a:rPr lang="en-US" sz="1200" dirty="0"/>
+              <a:t>Env is just the track with single triple jump (i.e. mk_trk1()). Plot show throttle and bike X position vs time.</a:t>
+            </a:r>
+          </a:p>
+          <a:p>
+            <a:r>
+              <a:rPr lang="en-US" sz="1200" dirty="0"/>
+              <a:t>We can see the trend towards more full throttle, shorter episode time, and monotonic </a:t>
+            </a:r>
+            <a:r>
+              <a:rPr lang="en-US" sz="1200" dirty="0" err="1"/>
+              <a:t>Xpos</a:t>
+            </a:r>
+            <a:r>
+              <a:rPr lang="en-US" sz="1200" dirty="0"/>
+              <a:t> increase over episode (i.e. no rolling back down jump face)</a:t>
+            </a:r>
+          </a:p>
+          <a:p>
+            <a:r>
+              <a:rPr lang="en-US" sz="1200" dirty="0"/>
+              <a:t>Reward at ep3000=3.4</a:t>
+            </a:r>
+          </a:p>
+          <a:p>
+            <a:r>
+              <a:rPr lang="en-US" sz="1200" dirty="0"/>
+              <a:t>Best reward =4.1</a:t>
+            </a:r>
+          </a:p>
+          <a:p>
+            <a:r>
+              <a:rPr lang="en-US" sz="1200" dirty="0"/>
+              <a:t>Worst reward = approx. -1e6</a:t>
+            </a:r>
           </a:p>
         </p:txBody>
       </p:sp>
@@ -3761,7 +3819,7 @@
           <p:cNvPr id="4" name="Picture 3">
             <a:extLst>
               <a:ext uri="{FF2B5EF4-FFF2-40B4-BE49-F238E27FC236}">
-                <a16:creationId xmlns:a16="http://schemas.microsoft.com/office/drawing/2014/main" id="{D716547E-1FEE-4680-B675-612695D4D9AE}"/>
+                <a16:creationId xmlns:a16="http://schemas.microsoft.com/office/drawing/2014/main" id="{02176ADC-38E6-4CC8-B6B5-F5829B28C57A}"/>
               </a:ext>
             </a:extLst>
           </p:cNvPr>
@@ -3778,8 +3836,8 @@
         </p:blipFill>
         <p:spPr>
           <a:xfrm>
-            <a:off x="0" y="4594870"/>
-            <a:ext cx="12192000" cy="1067242"/>
+            <a:off x="2391362" y="1690687"/>
+            <a:ext cx="9800637" cy="5088283"/>
           </a:xfrm>
           <a:prstGeom prst="rect">
             <a:avLst/>
@@ -3789,7 +3847,7 @@
     </p:spTree>
     <p:extLst>
       <p:ext uri="{BB962C8B-B14F-4D97-AF65-F5344CB8AC3E}">
-        <p14:creationId xmlns:p14="http://schemas.microsoft.com/office/powerpoint/2010/main" val="3653967205"/>
+        <p14:creationId xmlns:p14="http://schemas.microsoft.com/office/powerpoint/2010/main" val="1348317461"/>
       </p:ext>
     </p:extLst>
   </p:cSld>
@@ -3835,258 +3893,47 @@
         <p:spPr>
           <a:xfrm>
             <a:off x="157018" y="147782"/>
-            <a:ext cx="6566895" cy="6029181"/>
-          </a:xfrm>
-        </p:spPr>
-        <p:txBody>
-          <a:bodyPr>
-            <a:normAutofit/>
-          </a:bodyPr>
-          <a:lstStyle/>
-          <a:p>
-            <a:r>
-              <a:rPr lang="en-US" sz="1400" dirty="0"/>
-              <a:t>Mk_trk1 in run = 120ft</a:t>
-            </a:r>
-          </a:p>
-          <a:p>
-            <a:r>
-              <a:rPr lang="en-US" sz="1400" dirty="0"/>
-              <a:t>Order of figures: Ep1</a:t>
-            </a:r>
-            <a:r>
-              <a:rPr lang="en-US" sz="1400" dirty="0">
+            <a:ext cx="11196782" cy="6029181"/>
+          </a:xfrm>
+        </p:spPr>
+        <p:txBody>
+          <a:bodyPr/>
+          <a:lstStyle/>
+          <a:p>
+            <a:r>
+              <a:rPr lang="en-US" dirty="0"/>
+              <a:t>Shortened mk_trk1 starting flat section to be closer to agent look ahead distance, and this might be the cause of the almost no learning for that test</a:t>
+            </a:r>
+          </a:p>
+          <a:p>
+            <a:r>
+              <a:rPr lang="en-US" dirty="0"/>
+              <a:t>Order of figures: Ep3000</a:t>
+            </a:r>
+            <a:r>
+              <a:rPr lang="en-US" dirty="0">
                 <a:sym typeface="Wingdings" panose="05000000000000000000" pitchFamily="2" charset="2"/>
               </a:rPr>
-              <a:t>-&gt;ep3000</a:t>
-            </a:r>
-          </a:p>
-          <a:p>
-            <a:r>
-              <a:rPr lang="en-US" sz="1400" dirty="0">
+              <a:t>ep1</a:t>
+            </a:r>
+          </a:p>
+          <a:p>
+            <a:r>
+              <a:rPr lang="en-US" dirty="0">
                 <a:sym typeface="Wingdings" panose="05000000000000000000" pitchFamily="2" charset="2"/>
               </a:rPr>
-              <a:t>Here, global learning rate was slower than for the test on slides 6 &amp; 7</a:t>
-            </a:r>
-          </a:p>
-          <a:p>
-            <a:endParaRPr lang="en-US" sz="1400" dirty="0">
-              <a:sym typeface="Wingdings" panose="05000000000000000000" pitchFamily="2" charset="2"/>
-            </a:endParaRPr>
-          </a:p>
-          <a:p>
-            <a:endParaRPr lang="en-US" sz="1400" dirty="0">
-              <a:sym typeface="Wingdings" panose="05000000000000000000" pitchFamily="2" charset="2"/>
-            </a:endParaRPr>
-          </a:p>
-          <a:p>
-            <a:endParaRPr lang="en-US" sz="1400" dirty="0">
-              <a:sym typeface="Wingdings" panose="05000000000000000000" pitchFamily="2" charset="2"/>
-            </a:endParaRPr>
-          </a:p>
-          <a:p>
-            <a:endParaRPr lang="en-US" sz="1400" dirty="0">
-              <a:sym typeface="Wingdings" panose="05000000000000000000" pitchFamily="2" charset="2"/>
-            </a:endParaRPr>
-          </a:p>
-          <a:p>
-            <a:endParaRPr lang="en-US" sz="1400" dirty="0">
-              <a:sym typeface="Wingdings" panose="05000000000000000000" pitchFamily="2" charset="2"/>
-            </a:endParaRPr>
-          </a:p>
-          <a:p>
-            <a:endParaRPr lang="en-US" sz="1400" dirty="0">
-              <a:sym typeface="Wingdings" panose="05000000000000000000" pitchFamily="2" charset="2"/>
-            </a:endParaRPr>
-          </a:p>
-          <a:p>
-            <a:endParaRPr lang="en-US" sz="1400" dirty="0">
-              <a:sym typeface="Wingdings" panose="05000000000000000000" pitchFamily="2" charset="2"/>
-            </a:endParaRPr>
-          </a:p>
-          <a:p>
-            <a:endParaRPr lang="en-US" sz="1400" dirty="0">
-              <a:sym typeface="Wingdings" panose="05000000000000000000" pitchFamily="2" charset="2"/>
-            </a:endParaRPr>
-          </a:p>
-          <a:p>
-            <a:r>
-              <a:rPr lang="en-US" sz="1400" dirty="0">
-                <a:sym typeface="Wingdings" panose="05000000000000000000" pitchFamily="2" charset="2"/>
-              </a:rPr>
-              <a:t>Continue training after stop at ep3000, to ep6000</a:t>
-            </a:r>
-          </a:p>
-          <a:p>
-            <a:r>
-              <a:rPr lang="en-US" sz="1400" dirty="0">
-                <a:sym typeface="Wingdings" panose="05000000000000000000" pitchFamily="2" charset="2"/>
-              </a:rPr>
-              <a:t>We can see that here it took about 3500 episodes to achieve similar performance as we saw after only 2000 episodes on slides 6 &amp; 7</a:t>
-            </a:r>
-            <a:endParaRPr lang="en-US" sz="1400" dirty="0"/>
-          </a:p>
-        </p:txBody>
-      </p:sp>
-      <p:sp>
-        <p:nvSpPr>
-          <p:cNvPr id="5" name="TextBox 4">
-            <a:extLst>
-              <a:ext uri="{FF2B5EF4-FFF2-40B4-BE49-F238E27FC236}">
-                <a16:creationId xmlns:a16="http://schemas.microsoft.com/office/drawing/2014/main" id="{D334DA9E-1226-408B-BDDC-02CFF915D7CF}"/>
-              </a:ext>
-            </a:extLst>
-          </p:cNvPr>
-          <p:cNvSpPr txBox="1"/>
-          <p:nvPr/>
-        </p:nvSpPr>
-        <p:spPr>
-          <a:xfrm>
-            <a:off x="6723913" y="147782"/>
-            <a:ext cx="5311069" cy="2862322"/>
-          </a:xfrm>
-          <a:prstGeom prst="rect">
-            <a:avLst/>
-          </a:prstGeom>
-          <a:noFill/>
-        </p:spPr>
-        <p:txBody>
-          <a:bodyPr wrap="none" rtlCol="0">
-            <a:spAutoFit/>
-          </a:bodyPr>
-          <a:lstStyle/>
-          <a:p>
-            <a:r>
-              <a:rPr lang="en-US" sz="1000" dirty="0"/>
-              <a:t>Finished episode 2986 after 134 timesteps (reward: -3.2999999999999687)</a:t>
-            </a:r>
-          </a:p>
-          <a:p>
-            <a:r>
-              <a:rPr lang="en-US" sz="1000" dirty="0"/>
-              <a:t>Finished episode 2987 after 91 timesteps (reward: 1.000000000000016)</a:t>
-            </a:r>
-          </a:p>
-          <a:p>
-            <a:r>
-              <a:rPr lang="en-US" sz="1000" dirty="0"/>
-              <a:t>Finished episode 2988 after 109 timesteps (reward: -0.7999999999999776)</a:t>
-            </a:r>
-          </a:p>
-          <a:p>
-            <a:r>
-              <a:rPr lang="en-US" sz="1000" dirty="0"/>
-              <a:t>Finished episode 2989 after 122 timesteps (reward: -2.099999999999973)</a:t>
-            </a:r>
-          </a:p>
-          <a:p>
-            <a:r>
-              <a:rPr lang="en-US" sz="1000" dirty="0"/>
-              <a:t>Finished episode 2990 after 100 timesteps (reward: 0.10000000000001918)</a:t>
-            </a:r>
-          </a:p>
-          <a:p>
-            <a:r>
-              <a:rPr lang="en-US" sz="1000" dirty="0"/>
-              <a:t>Finished episode 2991 after 108 timesteps (reward: -0.699999999999978)</a:t>
-            </a:r>
-          </a:p>
-          <a:p>
-            <a:r>
-              <a:rPr lang="en-US" sz="1000" dirty="0"/>
-              <a:t>Finished episode 2992 after 104 timesteps (reward: -0.2999999999999794)</a:t>
-            </a:r>
-          </a:p>
-          <a:p>
-            <a:r>
-              <a:rPr lang="en-US" sz="1000" dirty="0"/>
-              <a:t>Finished episode 2993 after 106 timesteps (reward: -0.4999999999999787)</a:t>
-            </a:r>
-          </a:p>
-          <a:p>
-            <a:r>
-              <a:rPr lang="en-US" sz="1000" dirty="0"/>
-              <a:t>Finished episode 2994 after 184 timesteps (reward: -8.29999999999999)</a:t>
-            </a:r>
-          </a:p>
-          <a:p>
-            <a:r>
-              <a:rPr lang="en-US" sz="1000" dirty="0"/>
-              <a:t>Finished episode 2995 after 164 timesteps (reward: -6.299999999999962)</a:t>
-            </a:r>
-          </a:p>
-          <a:p>
-            <a:r>
-              <a:rPr lang="en-US" sz="1000" dirty="0"/>
-              <a:t>Finished episode 2996 after 96 timesteps (reward: 0.5000000000000178)</a:t>
-            </a:r>
-          </a:p>
-          <a:p>
-            <a:r>
-              <a:rPr lang="en-US" sz="1000" dirty="0"/>
-              <a:t>Finished episode 2997 after 122 timesteps (reward: -2.099999999999973)</a:t>
-            </a:r>
-          </a:p>
-          <a:p>
-            <a:r>
-              <a:rPr lang="en-US" sz="1000" dirty="0"/>
-              <a:t>Finished episode 2998 after 96 timesteps (reward: 0.5000000000000178)</a:t>
-            </a:r>
-          </a:p>
-          <a:p>
-            <a:r>
-              <a:rPr lang="en-US" sz="1000" dirty="0"/>
-              <a:t>Finished episode 2999 after 119 timesteps (reward: -1.799999999999974)</a:t>
-            </a:r>
-          </a:p>
-          <a:p>
-            <a:r>
-              <a:rPr lang="en-US" sz="1000" dirty="0"/>
-              <a:t>Finished episode 3000 after 140 timesteps (reward: -3.8999999999999666)</a:t>
-            </a:r>
-          </a:p>
-          <a:p>
-            <a:r>
-              <a:rPr lang="en-US" sz="1000" dirty="0" err="1"/>
-              <a:t>INFO:tensorflow:Saving</a:t>
-            </a:r>
-            <a:r>
-              <a:rPr lang="en-US" sz="1000" dirty="0"/>
-              <a:t> checkpoints for 632416 into ./savedTest02/</a:t>
-            </a:r>
-            <a:r>
-              <a:rPr lang="en-US" sz="1000" dirty="0" err="1"/>
-              <a:t>model.ckpt</a:t>
-            </a:r>
-            <a:r>
-              <a:rPr lang="en-US" sz="1000" dirty="0"/>
-              <a:t>.</a:t>
-            </a:r>
-          </a:p>
-          <a:p>
-            <a:r>
-              <a:rPr lang="en-US" sz="1000" dirty="0"/>
-              <a:t>Learning finished. Total episodes: 3000. Average reward of last 10 episodes: -2.289999999999977.</a:t>
-            </a:r>
-          </a:p>
-          <a:p>
-            <a:r>
-              <a:rPr lang="en-US" sz="1000" dirty="0" err="1"/>
-              <a:t>cummulative</a:t>
-            </a:r>
-            <a:r>
-              <a:rPr lang="en-US" sz="1000" dirty="0"/>
-              <a:t> execution time: 3585.5566997528076</a:t>
-            </a:r>
+              <a:t>Why is this? I think it could be because learning is a stochastic process, due the random element of the explore/exploit process, which means running the same experiment twice will not result in the same learning rate. So maybe this was just a bad experiment in terms of global learning rate (i.e. how much better agent gets over 300 episodes).</a:t>
+            </a:r>
+            <a:endParaRPr lang="en-US" dirty="0"/>
           </a:p>
         </p:txBody>
       </p:sp>
       <p:pic>
         <p:nvPicPr>
-          <p:cNvPr id="2" name="Picture 1">
-            <a:extLst>
-              <a:ext uri="{FF2B5EF4-FFF2-40B4-BE49-F238E27FC236}">
-                <a16:creationId xmlns:a16="http://schemas.microsoft.com/office/drawing/2014/main" id="{8164AD9A-8DC1-4FA0-8280-0F1B0966B410}"/>
+          <p:cNvPr id="4" name="Picture 3">
+            <a:extLst>
+              <a:ext uri="{FF2B5EF4-FFF2-40B4-BE49-F238E27FC236}">
+                <a16:creationId xmlns:a16="http://schemas.microsoft.com/office/drawing/2014/main" id="{D716547E-1FEE-4680-B675-612695D4D9AE}"/>
               </a:ext>
             </a:extLst>
           </p:cNvPr>
@@ -4103,197 +3950,8 @@
         </p:blipFill>
         <p:spPr>
           <a:xfrm>
-            <a:off x="0" y="1274025"/>
-            <a:ext cx="12192000" cy="1066006"/>
-          </a:xfrm>
-          <a:prstGeom prst="rect">
-            <a:avLst/>
-          </a:prstGeom>
-        </p:spPr>
-      </p:pic>
-      <p:sp>
-        <p:nvSpPr>
-          <p:cNvPr id="6" name="TextBox 5">
-            <a:extLst>
-              <a:ext uri="{FF2B5EF4-FFF2-40B4-BE49-F238E27FC236}">
-                <a16:creationId xmlns:a16="http://schemas.microsoft.com/office/drawing/2014/main" id="{8F1CEFE3-0234-4405-A51E-3DA4C250D15D}"/>
-              </a:ext>
-            </a:extLst>
-          </p:cNvPr>
-          <p:cNvSpPr txBox="1"/>
-          <p:nvPr/>
-        </p:nvSpPr>
-        <p:spPr>
-          <a:xfrm>
-            <a:off x="6723913" y="3857134"/>
-            <a:ext cx="5338321" cy="3016210"/>
-          </a:xfrm>
-          <a:prstGeom prst="rect">
-            <a:avLst/>
-          </a:prstGeom>
-          <a:noFill/>
-        </p:spPr>
-        <p:txBody>
-          <a:bodyPr wrap="none" rtlCol="0">
-            <a:spAutoFit/>
-          </a:bodyPr>
-          <a:lstStyle/>
-          <a:p>
-            <a:r>
-              <a:rPr lang="en-US" sz="1000" dirty="0"/>
-              <a:t>Finished episode 5985 after 58 timesteps (reward: 4.300000000000004)</a:t>
-            </a:r>
-          </a:p>
-          <a:p>
-            <a:r>
-              <a:rPr lang="en-US" sz="1000" dirty="0"/>
-              <a:t>Finished episode 5986 after 59 timesteps (reward: 4.200000000000005)</a:t>
-            </a:r>
-          </a:p>
-          <a:p>
-            <a:r>
-              <a:rPr lang="en-US" sz="1000" dirty="0"/>
-              <a:t>Finished episode 5987 after 58 timesteps (reward: 4.300000000000004)</a:t>
-            </a:r>
-          </a:p>
-          <a:p>
-            <a:r>
-              <a:rPr lang="en-US" sz="1000" dirty="0"/>
-              <a:t>Finished episode 5988 after 58 timesteps (reward: 4.300000000000004)</a:t>
-            </a:r>
-          </a:p>
-          <a:p>
-            <a:r>
-              <a:rPr lang="en-US" sz="1000" dirty="0"/>
-              <a:t>Finished episode 5989 after 59 timesteps (reward: 4.200000000000005)</a:t>
-            </a:r>
-          </a:p>
-          <a:p>
-            <a:r>
-              <a:rPr lang="en-US" sz="1000" dirty="0"/>
-              <a:t>Finished episode 5990 after 59 timesteps (reward: 4.200000000000005)</a:t>
-            </a:r>
-          </a:p>
-          <a:p>
-            <a:r>
-              <a:rPr lang="en-US" sz="1000" dirty="0"/>
-              <a:t>Finished episode 5991 after 58 timesteps (reward: 4.300000000000004)</a:t>
-            </a:r>
-          </a:p>
-          <a:p>
-            <a:r>
-              <a:rPr lang="en-US" sz="1000" dirty="0"/>
-              <a:t>Finished episode 5992 after 58 timesteps (reward: 4.300000000000004)</a:t>
-            </a:r>
-          </a:p>
-          <a:p>
-            <a:r>
-              <a:rPr lang="en-US" sz="1000" dirty="0"/>
-              <a:t>Finished episode 5993 after 59 timesteps (reward: 4.200000000000005)</a:t>
-            </a:r>
-          </a:p>
-          <a:p>
-            <a:r>
-              <a:rPr lang="en-US" sz="1000" dirty="0"/>
-              <a:t>Finished episode 5994 after 59 timesteps (reward: 4.200000000000005)</a:t>
-            </a:r>
-          </a:p>
-          <a:p>
-            <a:r>
-              <a:rPr lang="en-US" sz="1000" dirty="0"/>
-              <a:t>Finished episode 5995 after 59 timesteps (reward: 4.200000000000005)</a:t>
-            </a:r>
-          </a:p>
-          <a:p>
-            <a:r>
-              <a:rPr lang="en-US" sz="1000" dirty="0"/>
-              <a:t>Finished episode 5996 after 58 timesteps (reward: 4.300000000000004)</a:t>
-            </a:r>
-          </a:p>
-          <a:p>
-            <a:r>
-              <a:rPr lang="en-US" sz="1000" dirty="0"/>
-              <a:t>Finished episode 5997 after 58 timesteps (reward: 4.300000000000004)</a:t>
-            </a:r>
-          </a:p>
-          <a:p>
-            <a:r>
-              <a:rPr lang="en-US" sz="1000" dirty="0"/>
-              <a:t>Finished episode 5998 after 58 timesteps (reward: 4.300000000000004)</a:t>
-            </a:r>
-          </a:p>
-          <a:p>
-            <a:r>
-              <a:rPr lang="en-US" sz="1000" dirty="0"/>
-              <a:t>Finished episode 5999 after 57 timesteps (reward: 4.400000000000004)</a:t>
-            </a:r>
-          </a:p>
-          <a:p>
-            <a:r>
-              <a:rPr lang="en-US" sz="1000" dirty="0"/>
-              <a:t>Finished episode 6000 after 57 timesteps (reward: 4.400000000000004)</a:t>
-            </a:r>
-          </a:p>
-          <a:p>
-            <a:r>
-              <a:rPr lang="en-US" sz="1000" dirty="0" err="1"/>
-              <a:t>INFO:tensorflow:Saving</a:t>
-            </a:r>
-            <a:r>
-              <a:rPr lang="en-US" sz="1000" dirty="0"/>
-              <a:t> checkpoints for 858269 into ./savedTest02/</a:t>
-            </a:r>
-            <a:r>
-              <a:rPr lang="en-US" sz="1000" dirty="0" err="1"/>
-              <a:t>model.ckpt</a:t>
-            </a:r>
-            <a:r>
-              <a:rPr lang="en-US" sz="1000" dirty="0"/>
-              <a:t>.</a:t>
-            </a:r>
-          </a:p>
-          <a:p>
-            <a:r>
-              <a:rPr lang="en-US" sz="1000" dirty="0"/>
-              <a:t>Learning finished. Total episodes: 6000. Average reward of last 10 episodes: 4.2900000000000045.</a:t>
-            </a:r>
-          </a:p>
-          <a:p>
-            <a:r>
-              <a:rPr lang="en-US" sz="1000" dirty="0" err="1"/>
-              <a:t>cummulative</a:t>
-            </a:r>
-            <a:r>
-              <a:rPr lang="en-US" sz="1000" dirty="0"/>
-              <a:t> execution time: 1252.185539007187</a:t>
-            </a:r>
-          </a:p>
-        </p:txBody>
-      </p:sp>
-      <p:pic>
-        <p:nvPicPr>
-          <p:cNvPr id="7" name="Picture 6">
-            <a:extLst>
-              <a:ext uri="{FF2B5EF4-FFF2-40B4-BE49-F238E27FC236}">
-                <a16:creationId xmlns:a16="http://schemas.microsoft.com/office/drawing/2014/main" id="{A3D2ABA1-F240-4F7C-A411-68A3854CC699}"/>
-              </a:ext>
-            </a:extLst>
-          </p:cNvPr>
-          <p:cNvPicPr>
-            <a:picLocks noChangeAspect="1"/>
-          </p:cNvPicPr>
-          <p:nvPr/>
-        </p:nvPicPr>
-        <p:blipFill>
-          <a:blip r:embed="rId3"/>
-          <a:stretch>
-            <a:fillRect/>
-          </a:stretch>
-        </p:blipFill>
-        <p:spPr>
-          <a:xfrm>
-            <a:off x="0" y="4527207"/>
-            <a:ext cx="12192000" cy="1024835"/>
+            <a:off x="0" y="4594870"/>
+            <a:ext cx="12192000" cy="1067242"/>
           </a:xfrm>
           <a:prstGeom prst="rect">
             <a:avLst/>
@@ -4303,7 +3961,7 @@
     </p:spTree>
     <p:extLst>
       <p:ext uri="{BB962C8B-B14F-4D97-AF65-F5344CB8AC3E}">
-        <p14:creationId xmlns:p14="http://schemas.microsoft.com/office/powerpoint/2010/main" val="2017532896"/>
+        <p14:creationId xmlns:p14="http://schemas.microsoft.com/office/powerpoint/2010/main" val="3653967205"/>
       </p:ext>
     </p:extLst>
   </p:cSld>
@@ -4332,35 +3990,10 @@
       </p:grpSpPr>
       <p:sp>
         <p:nvSpPr>
-          <p:cNvPr id="2" name="Title 1">
-            <a:extLst>
-              <a:ext uri="{FF2B5EF4-FFF2-40B4-BE49-F238E27FC236}">
-                <a16:creationId xmlns:a16="http://schemas.microsoft.com/office/drawing/2014/main" id="{7CD49583-6822-48B7-9DA0-DAAB4313EBC3}"/>
-              </a:ext>
-            </a:extLst>
-          </p:cNvPr>
-          <p:cNvSpPr>
-            <a:spLocks noGrp="1"/>
-          </p:cNvSpPr>
-          <p:nvPr>
-            <p:ph type="title"/>
-          </p:nvPr>
-        </p:nvSpPr>
-        <p:spPr/>
-        <p:txBody>
-          <a:bodyPr/>
-          <a:lstStyle/>
-          <a:p>
-            <a:endParaRPr lang="en-US"/>
-          </a:p>
-        </p:txBody>
-      </p:sp>
-      <p:sp>
-        <p:nvSpPr>
           <p:cNvPr id="3" name="Content Placeholder 2">
             <a:extLst>
               <a:ext uri="{FF2B5EF4-FFF2-40B4-BE49-F238E27FC236}">
-                <a16:creationId xmlns:a16="http://schemas.microsoft.com/office/drawing/2014/main" id="{1AFCC15A-0192-4FD6-A39D-0625502806EA}"/>
+                <a16:creationId xmlns:a16="http://schemas.microsoft.com/office/drawing/2014/main" id="{EFB31903-0DEC-4695-A1E1-9EC4AAA7BE3B}"/>
               </a:ext>
             </a:extLst>
           </p:cNvPr>
@@ -4371,21 +4004,261 @@
             <p:ph idx="1"/>
           </p:nvPr>
         </p:nvSpPr>
-        <p:spPr/>
-        <p:txBody>
-          <a:bodyPr/>
-          <a:lstStyle/>
-          <a:p>
-            <a:endParaRPr lang="en-US"/>
+        <p:spPr>
+          <a:xfrm>
+            <a:off x="157018" y="147782"/>
+            <a:ext cx="6566895" cy="6029181"/>
+          </a:xfrm>
+        </p:spPr>
+        <p:txBody>
+          <a:bodyPr>
+            <a:normAutofit/>
+          </a:bodyPr>
+          <a:lstStyle/>
+          <a:p>
+            <a:r>
+              <a:rPr lang="en-US" sz="1400" dirty="0"/>
+              <a:t>Mk_trk1 in run = 120ft</a:t>
+            </a:r>
+          </a:p>
+          <a:p>
+            <a:r>
+              <a:rPr lang="en-US" sz="1400" dirty="0"/>
+              <a:t>Order of figures: Ep1</a:t>
+            </a:r>
+            <a:r>
+              <a:rPr lang="en-US" sz="1400" dirty="0">
+                <a:sym typeface="Wingdings" panose="05000000000000000000" pitchFamily="2" charset="2"/>
+              </a:rPr>
+              <a:t>-&gt;ep3000</a:t>
+            </a:r>
+          </a:p>
+          <a:p>
+            <a:r>
+              <a:rPr lang="en-US" sz="1400" dirty="0">
+                <a:sym typeface="Wingdings" panose="05000000000000000000" pitchFamily="2" charset="2"/>
+              </a:rPr>
+              <a:t>Here, global learning rate was slower than for the test on slides 6 &amp; 7</a:t>
+            </a:r>
+          </a:p>
+          <a:p>
+            <a:endParaRPr lang="en-US" sz="1400" dirty="0">
+              <a:sym typeface="Wingdings" panose="05000000000000000000" pitchFamily="2" charset="2"/>
+            </a:endParaRPr>
+          </a:p>
+          <a:p>
+            <a:endParaRPr lang="en-US" sz="1400" dirty="0">
+              <a:sym typeface="Wingdings" panose="05000000000000000000" pitchFamily="2" charset="2"/>
+            </a:endParaRPr>
+          </a:p>
+          <a:p>
+            <a:endParaRPr lang="en-US" sz="1400" dirty="0">
+              <a:sym typeface="Wingdings" panose="05000000000000000000" pitchFamily="2" charset="2"/>
+            </a:endParaRPr>
+          </a:p>
+          <a:p>
+            <a:endParaRPr lang="en-US" sz="1400" dirty="0">
+              <a:sym typeface="Wingdings" panose="05000000000000000000" pitchFamily="2" charset="2"/>
+            </a:endParaRPr>
+          </a:p>
+          <a:p>
+            <a:endParaRPr lang="en-US" sz="1400" dirty="0">
+              <a:sym typeface="Wingdings" panose="05000000000000000000" pitchFamily="2" charset="2"/>
+            </a:endParaRPr>
+          </a:p>
+          <a:p>
+            <a:endParaRPr lang="en-US" sz="1400" dirty="0">
+              <a:sym typeface="Wingdings" panose="05000000000000000000" pitchFamily="2" charset="2"/>
+            </a:endParaRPr>
+          </a:p>
+          <a:p>
+            <a:endParaRPr lang="en-US" sz="1400" dirty="0">
+              <a:sym typeface="Wingdings" panose="05000000000000000000" pitchFamily="2" charset="2"/>
+            </a:endParaRPr>
+          </a:p>
+          <a:p>
+            <a:endParaRPr lang="en-US" sz="1400" dirty="0">
+              <a:sym typeface="Wingdings" panose="05000000000000000000" pitchFamily="2" charset="2"/>
+            </a:endParaRPr>
+          </a:p>
+          <a:p>
+            <a:r>
+              <a:rPr lang="en-US" sz="1400" dirty="0">
+                <a:sym typeface="Wingdings" panose="05000000000000000000" pitchFamily="2" charset="2"/>
+              </a:rPr>
+              <a:t>Continue training after stop at ep3000, to ep6000</a:t>
+            </a:r>
+          </a:p>
+          <a:p>
+            <a:r>
+              <a:rPr lang="en-US" sz="1400" dirty="0">
+                <a:sym typeface="Wingdings" panose="05000000000000000000" pitchFamily="2" charset="2"/>
+              </a:rPr>
+              <a:t>We can see that here it took about 3500 episodes to achieve similar performance as we saw after only 2000 episodes on slides 6 &amp; 7</a:t>
+            </a:r>
+            <a:endParaRPr lang="en-US" sz="1400" dirty="0"/>
+          </a:p>
+        </p:txBody>
+      </p:sp>
+      <p:sp>
+        <p:nvSpPr>
+          <p:cNvPr id="5" name="TextBox 4">
+            <a:extLst>
+              <a:ext uri="{FF2B5EF4-FFF2-40B4-BE49-F238E27FC236}">
+                <a16:creationId xmlns:a16="http://schemas.microsoft.com/office/drawing/2014/main" id="{D334DA9E-1226-408B-BDDC-02CFF915D7CF}"/>
+              </a:ext>
+            </a:extLst>
+          </p:cNvPr>
+          <p:cNvSpPr txBox="1"/>
+          <p:nvPr/>
+        </p:nvSpPr>
+        <p:spPr>
+          <a:xfrm>
+            <a:off x="6723913" y="147782"/>
+            <a:ext cx="5311069" cy="2862322"/>
+          </a:xfrm>
+          <a:prstGeom prst="rect">
+            <a:avLst/>
+          </a:prstGeom>
+          <a:noFill/>
+        </p:spPr>
+        <p:txBody>
+          <a:bodyPr wrap="none" rtlCol="0">
+            <a:spAutoFit/>
+          </a:bodyPr>
+          <a:lstStyle/>
+          <a:p>
+            <a:r>
+              <a:rPr lang="en-US" sz="1000" dirty="0"/>
+              <a:t>Finished episode 2986 after 134 timesteps (reward: -3.2999999999999687)</a:t>
+            </a:r>
+          </a:p>
+          <a:p>
+            <a:r>
+              <a:rPr lang="en-US" sz="1000" dirty="0"/>
+              <a:t>Finished episode 2987 after 91 timesteps (reward: 1.000000000000016)</a:t>
+            </a:r>
+          </a:p>
+          <a:p>
+            <a:r>
+              <a:rPr lang="en-US" sz="1000" dirty="0"/>
+              <a:t>Finished episode 2988 after 109 timesteps (reward: -0.7999999999999776)</a:t>
+            </a:r>
+          </a:p>
+          <a:p>
+            <a:r>
+              <a:rPr lang="en-US" sz="1000" dirty="0"/>
+              <a:t>Finished episode 2989 after 122 timesteps (reward: -2.099999999999973)</a:t>
+            </a:r>
+          </a:p>
+          <a:p>
+            <a:r>
+              <a:rPr lang="en-US" sz="1000" dirty="0"/>
+              <a:t>Finished episode 2990 after 100 timesteps (reward: 0.10000000000001918)</a:t>
+            </a:r>
+          </a:p>
+          <a:p>
+            <a:r>
+              <a:rPr lang="en-US" sz="1000" dirty="0"/>
+              <a:t>Finished episode 2991 after 108 timesteps (reward: -0.699999999999978)</a:t>
+            </a:r>
+          </a:p>
+          <a:p>
+            <a:r>
+              <a:rPr lang="en-US" sz="1000" dirty="0"/>
+              <a:t>Finished episode 2992 after 104 timesteps (reward: -0.2999999999999794)</a:t>
+            </a:r>
+          </a:p>
+          <a:p>
+            <a:r>
+              <a:rPr lang="en-US" sz="1000" dirty="0"/>
+              <a:t>Finished episode 2993 after 106 timesteps (reward: -0.4999999999999787)</a:t>
+            </a:r>
+          </a:p>
+          <a:p>
+            <a:r>
+              <a:rPr lang="en-US" sz="1000" dirty="0"/>
+              <a:t>Finished episode 2994 after 184 timesteps (reward: -8.29999999999999)</a:t>
+            </a:r>
+          </a:p>
+          <a:p>
+            <a:r>
+              <a:rPr lang="en-US" sz="1000" dirty="0"/>
+              <a:t>Finished episode 2995 after 164 timesteps (reward: -6.299999999999962)</a:t>
+            </a:r>
+          </a:p>
+          <a:p>
+            <a:r>
+              <a:rPr lang="en-US" sz="1000" dirty="0"/>
+              <a:t>Finished episode 2996 after 96 timesteps (reward: 0.5000000000000178)</a:t>
+            </a:r>
+          </a:p>
+          <a:p>
+            <a:r>
+              <a:rPr lang="en-US" sz="1000" dirty="0"/>
+              <a:t>Finished episode 2997 after 122 timesteps (reward: -2.099999999999973)</a:t>
+            </a:r>
+          </a:p>
+          <a:p>
+            <a:r>
+              <a:rPr lang="en-US" sz="1000" dirty="0"/>
+              <a:t>Finished episode 2998 after 96 timesteps (reward: 0.5000000000000178)</a:t>
+            </a:r>
+          </a:p>
+          <a:p>
+            <a:r>
+              <a:rPr lang="en-US" sz="1000" dirty="0"/>
+              <a:t>Finished episode 2999 after 119 timesteps (reward: -1.799999999999974)</a:t>
+            </a:r>
+          </a:p>
+          <a:p>
+            <a:r>
+              <a:rPr lang="en-US" sz="1000" dirty="0"/>
+              <a:t>Finished episode 3000 after 140 timesteps (reward: -3.8999999999999666)</a:t>
+            </a:r>
+          </a:p>
+          <a:p>
+            <a:r>
+              <a:rPr lang="en-US" sz="1000" dirty="0" err="1"/>
+              <a:t>INFO:tensorflow:Saving</a:t>
+            </a:r>
+            <a:r>
+              <a:rPr lang="en-US" sz="1000" dirty="0"/>
+              <a:t> checkpoints for 632416 into ./savedTest02/</a:t>
+            </a:r>
+            <a:r>
+              <a:rPr lang="en-US" sz="1000" dirty="0" err="1"/>
+              <a:t>model.ckpt</a:t>
+            </a:r>
+            <a:r>
+              <a:rPr lang="en-US" sz="1000" dirty="0"/>
+              <a:t>.</a:t>
+            </a:r>
+          </a:p>
+          <a:p>
+            <a:r>
+              <a:rPr lang="en-US" sz="1000" dirty="0"/>
+              <a:t>Learning finished. Total episodes: 3000. Average reward of last 10 episodes: -2.289999999999977.</a:t>
+            </a:r>
+          </a:p>
+          <a:p>
+            <a:r>
+              <a:rPr lang="en-US" sz="1000" dirty="0" err="1"/>
+              <a:t>cummulative</a:t>
+            </a:r>
+            <a:r>
+              <a:rPr lang="en-US" sz="1000" dirty="0"/>
+              <a:t> execution time: 3585.5566997528076</a:t>
+            </a:r>
           </a:p>
         </p:txBody>
       </p:sp>
       <p:pic>
         <p:nvPicPr>
-          <p:cNvPr id="4" name="Picture 3">
-            <a:extLst>
-              <a:ext uri="{FF2B5EF4-FFF2-40B4-BE49-F238E27FC236}">
-                <a16:creationId xmlns:a16="http://schemas.microsoft.com/office/drawing/2014/main" id="{BAA89151-6B80-46EC-96A3-B3EC51CFA887}"/>
+          <p:cNvPr id="2" name="Picture 1">
+            <a:extLst>
+              <a:ext uri="{FF2B5EF4-FFF2-40B4-BE49-F238E27FC236}">
+                <a16:creationId xmlns:a16="http://schemas.microsoft.com/office/drawing/2014/main" id="{8164AD9A-8DC1-4FA0-8280-0F1B0966B410}"/>
               </a:ext>
             </a:extLst>
           </p:cNvPr>
@@ -4402,8 +4275,197 @@
         </p:blipFill>
         <p:spPr>
           <a:xfrm>
-            <a:off x="0" y="307297"/>
-            <a:ext cx="12192000" cy="6243405"/>
+            <a:off x="0" y="1274025"/>
+            <a:ext cx="12192000" cy="1066006"/>
+          </a:xfrm>
+          <a:prstGeom prst="rect">
+            <a:avLst/>
+          </a:prstGeom>
+        </p:spPr>
+      </p:pic>
+      <p:sp>
+        <p:nvSpPr>
+          <p:cNvPr id="6" name="TextBox 5">
+            <a:extLst>
+              <a:ext uri="{FF2B5EF4-FFF2-40B4-BE49-F238E27FC236}">
+                <a16:creationId xmlns:a16="http://schemas.microsoft.com/office/drawing/2014/main" id="{8F1CEFE3-0234-4405-A51E-3DA4C250D15D}"/>
+              </a:ext>
+            </a:extLst>
+          </p:cNvPr>
+          <p:cNvSpPr txBox="1"/>
+          <p:nvPr/>
+        </p:nvSpPr>
+        <p:spPr>
+          <a:xfrm>
+            <a:off x="6723913" y="3857134"/>
+            <a:ext cx="5338321" cy="3016210"/>
+          </a:xfrm>
+          <a:prstGeom prst="rect">
+            <a:avLst/>
+          </a:prstGeom>
+          <a:noFill/>
+        </p:spPr>
+        <p:txBody>
+          <a:bodyPr wrap="none" rtlCol="0">
+            <a:spAutoFit/>
+          </a:bodyPr>
+          <a:lstStyle/>
+          <a:p>
+            <a:r>
+              <a:rPr lang="en-US" sz="1000" dirty="0"/>
+              <a:t>Finished episode 5985 after 58 timesteps (reward: 4.300000000000004)</a:t>
+            </a:r>
+          </a:p>
+          <a:p>
+            <a:r>
+              <a:rPr lang="en-US" sz="1000" dirty="0"/>
+              <a:t>Finished episode 5986 after 59 timesteps (reward: 4.200000000000005)</a:t>
+            </a:r>
+          </a:p>
+          <a:p>
+            <a:r>
+              <a:rPr lang="en-US" sz="1000" dirty="0"/>
+              <a:t>Finished episode 5987 after 58 timesteps (reward: 4.300000000000004)</a:t>
+            </a:r>
+          </a:p>
+          <a:p>
+            <a:r>
+              <a:rPr lang="en-US" sz="1000" dirty="0"/>
+              <a:t>Finished episode 5988 after 58 timesteps (reward: 4.300000000000004)</a:t>
+            </a:r>
+          </a:p>
+          <a:p>
+            <a:r>
+              <a:rPr lang="en-US" sz="1000" dirty="0"/>
+              <a:t>Finished episode 5989 after 59 timesteps (reward: 4.200000000000005)</a:t>
+            </a:r>
+          </a:p>
+          <a:p>
+            <a:r>
+              <a:rPr lang="en-US" sz="1000" dirty="0"/>
+              <a:t>Finished episode 5990 after 59 timesteps (reward: 4.200000000000005)</a:t>
+            </a:r>
+          </a:p>
+          <a:p>
+            <a:r>
+              <a:rPr lang="en-US" sz="1000" dirty="0"/>
+              <a:t>Finished episode 5991 after 58 timesteps (reward: 4.300000000000004)</a:t>
+            </a:r>
+          </a:p>
+          <a:p>
+            <a:r>
+              <a:rPr lang="en-US" sz="1000" dirty="0"/>
+              <a:t>Finished episode 5992 after 58 timesteps (reward: 4.300000000000004)</a:t>
+            </a:r>
+          </a:p>
+          <a:p>
+            <a:r>
+              <a:rPr lang="en-US" sz="1000" dirty="0"/>
+              <a:t>Finished episode 5993 after 59 timesteps (reward: 4.200000000000005)</a:t>
+            </a:r>
+          </a:p>
+          <a:p>
+            <a:r>
+              <a:rPr lang="en-US" sz="1000" dirty="0"/>
+              <a:t>Finished episode 5994 after 59 timesteps (reward: 4.200000000000005)</a:t>
+            </a:r>
+          </a:p>
+          <a:p>
+            <a:r>
+              <a:rPr lang="en-US" sz="1000" dirty="0"/>
+              <a:t>Finished episode 5995 after 59 timesteps (reward: 4.200000000000005)</a:t>
+            </a:r>
+          </a:p>
+          <a:p>
+            <a:r>
+              <a:rPr lang="en-US" sz="1000" dirty="0"/>
+              <a:t>Finished episode 5996 after 58 timesteps (reward: 4.300000000000004)</a:t>
+            </a:r>
+          </a:p>
+          <a:p>
+            <a:r>
+              <a:rPr lang="en-US" sz="1000" dirty="0"/>
+              <a:t>Finished episode 5997 after 58 timesteps (reward: 4.300000000000004)</a:t>
+            </a:r>
+          </a:p>
+          <a:p>
+            <a:r>
+              <a:rPr lang="en-US" sz="1000" dirty="0"/>
+              <a:t>Finished episode 5998 after 58 timesteps (reward: 4.300000000000004)</a:t>
+            </a:r>
+          </a:p>
+          <a:p>
+            <a:r>
+              <a:rPr lang="en-US" sz="1000" dirty="0"/>
+              <a:t>Finished episode 5999 after 57 timesteps (reward: 4.400000000000004)</a:t>
+            </a:r>
+          </a:p>
+          <a:p>
+            <a:r>
+              <a:rPr lang="en-US" sz="1000" dirty="0"/>
+              <a:t>Finished episode 6000 after 57 timesteps (reward: 4.400000000000004)</a:t>
+            </a:r>
+          </a:p>
+          <a:p>
+            <a:r>
+              <a:rPr lang="en-US" sz="1000" dirty="0" err="1"/>
+              <a:t>INFO:tensorflow:Saving</a:t>
+            </a:r>
+            <a:r>
+              <a:rPr lang="en-US" sz="1000" dirty="0"/>
+              <a:t> checkpoints for 858269 into ./savedTest02/</a:t>
+            </a:r>
+            <a:r>
+              <a:rPr lang="en-US" sz="1000" dirty="0" err="1"/>
+              <a:t>model.ckpt</a:t>
+            </a:r>
+            <a:r>
+              <a:rPr lang="en-US" sz="1000" dirty="0"/>
+              <a:t>.</a:t>
+            </a:r>
+          </a:p>
+          <a:p>
+            <a:r>
+              <a:rPr lang="en-US" sz="1000" dirty="0"/>
+              <a:t>Learning finished. Total episodes: 6000. Average reward of last 10 episodes: 4.2900000000000045.</a:t>
+            </a:r>
+          </a:p>
+          <a:p>
+            <a:r>
+              <a:rPr lang="en-US" sz="1000" dirty="0" err="1"/>
+              <a:t>cummulative</a:t>
+            </a:r>
+            <a:r>
+              <a:rPr lang="en-US" sz="1000" dirty="0"/>
+              <a:t> execution time: 1252.185539007187</a:t>
+            </a:r>
+          </a:p>
+        </p:txBody>
+      </p:sp>
+      <p:pic>
+        <p:nvPicPr>
+          <p:cNvPr id="7" name="Picture 6">
+            <a:extLst>
+              <a:ext uri="{FF2B5EF4-FFF2-40B4-BE49-F238E27FC236}">
+                <a16:creationId xmlns:a16="http://schemas.microsoft.com/office/drawing/2014/main" id="{A3D2ABA1-F240-4F7C-A411-68A3854CC699}"/>
+              </a:ext>
+            </a:extLst>
+          </p:cNvPr>
+          <p:cNvPicPr>
+            <a:picLocks noChangeAspect="1"/>
+          </p:cNvPicPr>
+          <p:nvPr/>
+        </p:nvPicPr>
+        <p:blipFill>
+          <a:blip r:embed="rId3"/>
+          <a:stretch>
+            <a:fillRect/>
+          </a:stretch>
+        </p:blipFill>
+        <p:spPr>
+          <a:xfrm>
+            <a:off x="0" y="4527207"/>
+            <a:ext cx="12192000" cy="1024835"/>
           </a:xfrm>
           <a:prstGeom prst="rect">
             <a:avLst/>
@@ -4413,7 +4475,7 @@
     </p:spTree>
     <p:extLst>
       <p:ext uri="{BB962C8B-B14F-4D97-AF65-F5344CB8AC3E}">
-        <p14:creationId xmlns:p14="http://schemas.microsoft.com/office/powerpoint/2010/main" val="1050036121"/>
+        <p14:creationId xmlns:p14="http://schemas.microsoft.com/office/powerpoint/2010/main" val="2017532896"/>
       </p:ext>
     </p:extLst>
   </p:cSld>
@@ -4442,10 +4504,35 @@
       </p:grpSpPr>
       <p:sp>
         <p:nvSpPr>
+          <p:cNvPr id="2" name="Title 1">
+            <a:extLst>
+              <a:ext uri="{FF2B5EF4-FFF2-40B4-BE49-F238E27FC236}">
+                <a16:creationId xmlns:a16="http://schemas.microsoft.com/office/drawing/2014/main" id="{7CD49583-6822-48B7-9DA0-DAAB4313EBC3}"/>
+              </a:ext>
+            </a:extLst>
+          </p:cNvPr>
+          <p:cNvSpPr>
+            <a:spLocks noGrp="1"/>
+          </p:cNvSpPr>
+          <p:nvPr>
+            <p:ph type="title"/>
+          </p:nvPr>
+        </p:nvSpPr>
+        <p:spPr/>
+        <p:txBody>
+          <a:bodyPr/>
+          <a:lstStyle/>
+          <a:p>
+            <a:endParaRPr lang="en-US"/>
+          </a:p>
+        </p:txBody>
+      </p:sp>
+      <p:sp>
+        <p:nvSpPr>
           <p:cNvPr id="3" name="Content Placeholder 2">
             <a:extLst>
               <a:ext uri="{FF2B5EF4-FFF2-40B4-BE49-F238E27FC236}">
-                <a16:creationId xmlns:a16="http://schemas.microsoft.com/office/drawing/2014/main" id="{E26834B7-7DB9-447E-B290-A1D4E2D6EC79}"/>
+                <a16:creationId xmlns:a16="http://schemas.microsoft.com/office/drawing/2014/main" id="{1AFCC15A-0192-4FD6-A39D-0625502806EA}"/>
               </a:ext>
             </a:extLst>
           </p:cNvPr>
@@ -4456,6 +4543,91 @@
             <p:ph idx="1"/>
           </p:nvPr>
         </p:nvSpPr>
+        <p:spPr/>
+        <p:txBody>
+          <a:bodyPr/>
+          <a:lstStyle/>
+          <a:p>
+            <a:endParaRPr lang="en-US"/>
+          </a:p>
+        </p:txBody>
+      </p:sp>
+      <p:pic>
+        <p:nvPicPr>
+          <p:cNvPr id="4" name="Picture 3">
+            <a:extLst>
+              <a:ext uri="{FF2B5EF4-FFF2-40B4-BE49-F238E27FC236}">
+                <a16:creationId xmlns:a16="http://schemas.microsoft.com/office/drawing/2014/main" id="{BAA89151-6B80-46EC-96A3-B3EC51CFA887}"/>
+              </a:ext>
+            </a:extLst>
+          </p:cNvPr>
+          <p:cNvPicPr>
+            <a:picLocks noChangeAspect="1"/>
+          </p:cNvPicPr>
+          <p:nvPr/>
+        </p:nvPicPr>
+        <p:blipFill>
+          <a:blip r:embed="rId2"/>
+          <a:stretch>
+            <a:fillRect/>
+          </a:stretch>
+        </p:blipFill>
+        <p:spPr>
+          <a:xfrm>
+            <a:off x="0" y="307297"/>
+            <a:ext cx="12192000" cy="6243405"/>
+          </a:xfrm>
+          <a:prstGeom prst="rect">
+            <a:avLst/>
+          </a:prstGeom>
+        </p:spPr>
+      </p:pic>
+    </p:spTree>
+    <p:extLst>
+      <p:ext uri="{BB962C8B-B14F-4D97-AF65-F5344CB8AC3E}">
+        <p14:creationId xmlns:p14="http://schemas.microsoft.com/office/powerpoint/2010/main" val="1050036121"/>
+      </p:ext>
+    </p:extLst>
+  </p:cSld>
+  <p:clrMapOvr>
+    <a:masterClrMapping/>
+  </p:clrMapOvr>
+</p:sld>
+</file>
+
+<file path=ppt/slides/slide15.xml><?xml version="1.0" encoding="utf-8"?>
+<p:sld xmlns:a="http://schemas.openxmlformats.org/drawingml/2006/main" xmlns:r="http://schemas.openxmlformats.org/officeDocument/2006/relationships" xmlns:p="http://schemas.openxmlformats.org/presentationml/2006/main">
+  <p:cSld>
+    <p:spTree>
+      <p:nvGrpSpPr>
+        <p:cNvPr id="1" name=""/>
+        <p:cNvGrpSpPr/>
+        <p:nvPr/>
+      </p:nvGrpSpPr>
+      <p:grpSpPr>
+        <a:xfrm>
+          <a:off x="0" y="0"/>
+          <a:ext cx="0" cy="0"/>
+          <a:chOff x="0" y="0"/>
+          <a:chExt cx="0" cy="0"/>
+        </a:xfrm>
+      </p:grpSpPr>
+      <p:sp>
+        <p:nvSpPr>
+          <p:cNvPr id="3" name="Content Placeholder 2">
+            <a:extLst>
+              <a:ext uri="{FF2B5EF4-FFF2-40B4-BE49-F238E27FC236}">
+                <a16:creationId xmlns:a16="http://schemas.microsoft.com/office/drawing/2014/main" id="{E26834B7-7DB9-447E-B290-A1D4E2D6EC79}"/>
+              </a:ext>
+            </a:extLst>
+          </p:cNvPr>
+          <p:cNvSpPr>
+            <a:spLocks noGrp="1"/>
+          </p:cNvSpPr>
+          <p:nvPr>
+            <p:ph idx="1"/>
+          </p:nvPr>
+        </p:nvSpPr>
         <p:spPr>
           <a:xfrm>
             <a:off x="0" y="5968"/>
@@ -4541,6 +4713,16 @@
             <a:r>
               <a:rPr lang="en-US" sz="1000" dirty="0"/>
               <a:t>” of a race that takes just a tiny fraction less time than another, which means a “win” in the context of racing. So maybe keep track of the best time so far, and then once the time for the present race is longer, scale the per step rewards to be a larger negative reward? </a:t>
+            </a:r>
+          </a:p>
+          <a:p>
+            <a:pPr lvl="2">
+              <a:buFont typeface="+mj-lt"/>
+              <a:buAutoNum type="arabicPeriod"/>
+            </a:pPr>
+            <a:r>
+              <a:rPr lang="en-US" sz="1000" dirty="0"/>
+              <a:t>This only works if the track is the same for every episode.  Even for 2 tracks with same feature, and same length, but  with different feature order, we should expect a different best possible time. So the only way this could work is if each track were given a index, and the best times were tracked for each tracked index.</a:t>
             </a:r>
           </a:p>
           <a:p>
@@ -4767,7 +4949,7 @@
             </a:r>
             <a:r>
               <a:rPr lang="en-US" sz="1600" dirty="0"/>
-              <a:t> Moto 8 movie “supercross is like a game of chess” alluding to the strategic part of jumping relative to your opponent.</a:t>
+              <a:t> Moto 8 movie narrator “supercross is like a game of chess” alluding to the strategic part of jumping relative to your opponent.</a:t>
             </a:r>
           </a:p>
           <a:p>
@@ -4828,6 +5010,64 @@
             <a:r>
               <a:rPr lang="en-US" sz="1600" dirty="0"/>
               <a:t>rhythm section, ep34. double, triple, quad, on/off combinations</a:t>
+            </a:r>
+          </a:p>
+          <a:p>
+            <a:pPr marL="342900" indent="-342900" algn="l">
+              <a:buFont typeface="+mj-lt"/>
+              <a:buAutoNum type="arabicPeriod"/>
+            </a:pPr>
+            <a:r>
+              <a:rPr lang="en-US" sz="2000" dirty="0"/>
+              <a:t>Why make my own environment?</a:t>
+            </a:r>
+          </a:p>
+          <a:p>
+            <a:pPr marL="800100" lvl="1" indent="-342900" algn="l">
+              <a:buFont typeface="+mj-lt"/>
+              <a:buAutoNum type="arabicPeriod"/>
+            </a:pPr>
+            <a:r>
+              <a:rPr lang="en-US" sz="1600" dirty="0"/>
+              <a:t>Was not aware of a 2D motocross/supercross game that had realistic track profiles (features types, approach radii, landing radii, etc.), and realistic bike performance (suspension behavior, power and drag characteristics, etc.).</a:t>
+            </a:r>
+          </a:p>
+          <a:p>
+            <a:pPr marL="800100" lvl="1" indent="-342900" algn="l">
+              <a:buFont typeface="+mj-lt"/>
+              <a:buAutoNum type="arabicPeriod"/>
+            </a:pPr>
+            <a:r>
+              <a:rPr lang="en-US" sz="1600" dirty="0"/>
+              <a:t>Did not want a degree of freedom allowing the </a:t>
+            </a:r>
+            <a:r>
+              <a:rPr lang="en-US" sz="1600" dirty="0" err="1"/>
+              <a:t>bike+wheel</a:t>
+            </a:r>
+            <a:r>
+              <a:rPr lang="en-US" sz="1600" dirty="0"/>
+              <a:t> body to rotate.</a:t>
+            </a:r>
+          </a:p>
+          <a:p>
+            <a:pPr marL="800100" lvl="1" indent="-342900" algn="l">
+              <a:buFont typeface="+mj-lt"/>
+              <a:buAutoNum type="arabicPeriod"/>
+            </a:pPr>
+            <a:r>
+              <a:rPr lang="en-US" sz="1600" dirty="0"/>
+              <a:t>3D moto/supercross games offer too many degrees of freedom for this initial work.</a:t>
+            </a:r>
+          </a:p>
+          <a:p>
+            <a:pPr marL="800100" lvl="1" indent="-342900" algn="l">
+              <a:buFont typeface="+mj-lt"/>
+              <a:buAutoNum type="arabicPeriod"/>
+            </a:pPr>
+            <a:r>
+              <a:rPr lang="en-US" sz="1600" dirty="0"/>
+              <a:t>It was a good learning experience, and it was fun.</a:t>
             </a:r>
           </a:p>
         </p:txBody>
@@ -6437,42 +6677,12 @@
           <a:chExt cx="0" cy="0"/>
         </a:xfrm>
       </p:grpSpPr>
-      <p:pic>
-        <p:nvPicPr>
-          <p:cNvPr id="4" name="Picture 3">
-            <a:extLst>
-              <a:ext uri="{FF2B5EF4-FFF2-40B4-BE49-F238E27FC236}">
-                <a16:creationId xmlns:a16="http://schemas.microsoft.com/office/drawing/2014/main" id="{3EC3AE23-9574-4C3F-B754-E74299D67259}"/>
-              </a:ext>
-            </a:extLst>
-          </p:cNvPr>
-          <p:cNvPicPr>
-            <a:picLocks noChangeAspect="1"/>
-          </p:cNvPicPr>
-          <p:nvPr/>
-        </p:nvPicPr>
-        <p:blipFill>
-          <a:blip r:embed="rId2"/>
-          <a:stretch>
-            <a:fillRect/>
-          </a:stretch>
-        </p:blipFill>
-        <p:spPr>
-          <a:xfrm>
-            <a:off x="4779514" y="907345"/>
-            <a:ext cx="3870664" cy="2908154"/>
-          </a:xfrm>
-          <a:prstGeom prst="rect">
-            <a:avLst/>
-          </a:prstGeom>
-        </p:spPr>
-      </p:pic>
-      <p:sp>
-        <p:nvSpPr>
-          <p:cNvPr id="10" name="Subtitle 2">
-            <a:extLst>
-              <a:ext uri="{FF2B5EF4-FFF2-40B4-BE49-F238E27FC236}">
-                <a16:creationId xmlns:a16="http://schemas.microsoft.com/office/drawing/2014/main" id="{9A5F9AA3-2E5B-4F47-911C-CFA57DC44BFF}"/>
+      <p:sp>
+        <p:nvSpPr>
+          <p:cNvPr id="2" name="Title 1">
+            <a:extLst>
+              <a:ext uri="{FF2B5EF4-FFF2-40B4-BE49-F238E27FC236}">
+                <a16:creationId xmlns:a16="http://schemas.microsoft.com/office/drawing/2014/main" id="{324E0CB4-7CDA-4FDF-AB0C-39C5AAB36034}"/>
               </a:ext>
             </a:extLst>
           </p:cNvPr>
@@ -6480,331 +6690,246 @@
             <a:spLocks noGrp="1"/>
           </p:cNvSpPr>
           <p:nvPr>
-            <p:ph type="subTitle" idx="1"/>
+            <p:ph type="title"/>
           </p:nvPr>
         </p:nvSpPr>
-        <p:spPr>
-          <a:xfrm>
-            <a:off x="0" y="114223"/>
-            <a:ext cx="12082509" cy="2693632"/>
-          </a:xfrm>
-        </p:spPr>
-        <p:txBody>
-          <a:bodyPr>
-            <a:normAutofit/>
-          </a:bodyPr>
-          <a:lstStyle/>
-          <a:p>
-            <a:pPr algn="l"/>
-            <a:r>
-              <a:rPr lang="en-US" sz="1600" dirty="0"/>
-              <a:t>Environment validation. Is the environment realistic relative to a real supercross bike and track?</a:t>
-            </a:r>
-          </a:p>
-        </p:txBody>
-      </p:sp>
-      <p:sp>
-        <p:nvSpPr>
-          <p:cNvPr id="2" name="TextBox 1">
-            <a:extLst>
-              <a:ext uri="{FF2B5EF4-FFF2-40B4-BE49-F238E27FC236}">
-                <a16:creationId xmlns:a16="http://schemas.microsoft.com/office/drawing/2014/main" id="{2CF4C17D-2BE4-4404-BA20-025F8D3E4BCC}"/>
-              </a:ext>
-            </a:extLst>
-          </p:cNvPr>
-          <p:cNvSpPr txBox="1"/>
+        <p:spPr/>
+        <p:txBody>
+          <a:bodyPr/>
+          <a:lstStyle/>
+          <a:p>
+            <a:r>
+              <a:rPr lang="en-US" dirty="0"/>
+              <a:t>Environment validation</a:t>
+            </a:r>
+          </a:p>
+        </p:txBody>
+      </p:sp>
+      <p:sp>
+        <p:nvSpPr>
+          <p:cNvPr id="3" name="Subtitle 2">
+            <a:extLst>
+              <a:ext uri="{FF2B5EF4-FFF2-40B4-BE49-F238E27FC236}">
+                <a16:creationId xmlns:a16="http://schemas.microsoft.com/office/drawing/2014/main" id="{10068E67-366C-413A-9689-9DC4F399CC7C}"/>
+              </a:ext>
+            </a:extLst>
+          </p:cNvPr>
+          <p:cNvSpPr txBox="1">
+            <a:spLocks/>
+          </p:cNvSpPr>
           <p:nvPr/>
         </p:nvSpPr>
         <p:spPr>
           <a:xfrm>
-            <a:off x="5901001" y="3235635"/>
-            <a:ext cx="1835502" cy="369332"/>
+            <a:off x="103573" y="1968547"/>
+            <a:ext cx="9144000" cy="4734755"/>
           </a:xfrm>
           <a:prstGeom prst="rect">
             <a:avLst/>
           </a:prstGeom>
-          <a:noFill/>
-        </p:spPr>
-        <p:txBody>
-          <a:bodyPr wrap="none" rtlCol="0">
-            <a:spAutoFit/>
+        </p:spPr>
+        <p:txBody>
+          <a:bodyPr vert="horz" lIns="91440" tIns="45720" rIns="91440" bIns="45720" rtlCol="0">
+            <a:normAutofit/>
           </a:bodyPr>
-          <a:lstStyle/>
+          <a:lstStyle>
+            <a:lvl1pPr marL="228600" indent="-228600" algn="l" defTabSz="914400" rtl="0" eaLnBrk="1" latinLnBrk="0" hangingPunct="1">
+              <a:lnSpc>
+                <a:spcPct val="90000"/>
+              </a:lnSpc>
+              <a:spcBef>
+                <a:spcPts val="1000"/>
+              </a:spcBef>
+              <a:buFont typeface="Arial" panose="020B0604020202020204" pitchFamily="34" charset="0"/>
+              <a:buChar char="•"/>
+              <a:defRPr sz="2800" kern="1200">
+                <a:solidFill>
+                  <a:schemeClr val="tx1"/>
+                </a:solidFill>
+                <a:latin typeface="+mn-lt"/>
+                <a:ea typeface="+mn-ea"/>
+                <a:cs typeface="+mn-cs"/>
+              </a:defRPr>
+            </a:lvl1pPr>
+            <a:lvl2pPr marL="685800" indent="-228600" algn="l" defTabSz="914400" rtl="0" eaLnBrk="1" latinLnBrk="0" hangingPunct="1">
+              <a:lnSpc>
+                <a:spcPct val="90000"/>
+              </a:lnSpc>
+              <a:spcBef>
+                <a:spcPts val="500"/>
+              </a:spcBef>
+              <a:buFont typeface="Arial" panose="020B0604020202020204" pitchFamily="34" charset="0"/>
+              <a:buChar char="•"/>
+              <a:defRPr sz="2400" kern="1200">
+                <a:solidFill>
+                  <a:schemeClr val="tx1"/>
+                </a:solidFill>
+                <a:latin typeface="+mn-lt"/>
+                <a:ea typeface="+mn-ea"/>
+                <a:cs typeface="+mn-cs"/>
+              </a:defRPr>
+            </a:lvl2pPr>
+            <a:lvl3pPr marL="1143000" indent="-228600" algn="l" defTabSz="914400" rtl="0" eaLnBrk="1" latinLnBrk="0" hangingPunct="1">
+              <a:lnSpc>
+                <a:spcPct val="90000"/>
+              </a:lnSpc>
+              <a:spcBef>
+                <a:spcPts val="500"/>
+              </a:spcBef>
+              <a:buFont typeface="Arial" panose="020B0604020202020204" pitchFamily="34" charset="0"/>
+              <a:buChar char="•"/>
+              <a:defRPr sz="2000" kern="1200">
+                <a:solidFill>
+                  <a:schemeClr val="tx1"/>
+                </a:solidFill>
+                <a:latin typeface="+mn-lt"/>
+                <a:ea typeface="+mn-ea"/>
+                <a:cs typeface="+mn-cs"/>
+              </a:defRPr>
+            </a:lvl3pPr>
+            <a:lvl4pPr marL="1600200" indent="-228600" algn="l" defTabSz="914400" rtl="0" eaLnBrk="1" latinLnBrk="0" hangingPunct="1">
+              <a:lnSpc>
+                <a:spcPct val="90000"/>
+              </a:lnSpc>
+              <a:spcBef>
+                <a:spcPts val="500"/>
+              </a:spcBef>
+              <a:buFont typeface="Arial" panose="020B0604020202020204" pitchFamily="34" charset="0"/>
+              <a:buChar char="•"/>
+              <a:defRPr sz="1800" kern="1200">
+                <a:solidFill>
+                  <a:schemeClr val="tx1"/>
+                </a:solidFill>
+                <a:latin typeface="+mn-lt"/>
+                <a:ea typeface="+mn-ea"/>
+                <a:cs typeface="+mn-cs"/>
+              </a:defRPr>
+            </a:lvl4pPr>
+            <a:lvl5pPr marL="2057400" indent="-228600" algn="l" defTabSz="914400" rtl="0" eaLnBrk="1" latinLnBrk="0" hangingPunct="1">
+              <a:lnSpc>
+                <a:spcPct val="90000"/>
+              </a:lnSpc>
+              <a:spcBef>
+                <a:spcPts val="500"/>
+              </a:spcBef>
+              <a:buFont typeface="Arial" panose="020B0604020202020204" pitchFamily="34" charset="0"/>
+              <a:buChar char="•"/>
+              <a:defRPr sz="1800" kern="1200">
+                <a:solidFill>
+                  <a:schemeClr val="tx1"/>
+                </a:solidFill>
+                <a:latin typeface="+mn-lt"/>
+                <a:ea typeface="+mn-ea"/>
+                <a:cs typeface="+mn-cs"/>
+              </a:defRPr>
+            </a:lvl5pPr>
+            <a:lvl6pPr marL="2514600" indent="-228600" algn="l" defTabSz="914400" rtl="0" eaLnBrk="1" latinLnBrk="0" hangingPunct="1">
+              <a:lnSpc>
+                <a:spcPct val="90000"/>
+              </a:lnSpc>
+              <a:spcBef>
+                <a:spcPts val="500"/>
+              </a:spcBef>
+              <a:buFont typeface="Arial" panose="020B0604020202020204" pitchFamily="34" charset="0"/>
+              <a:buChar char="•"/>
+              <a:defRPr sz="1800" kern="1200">
+                <a:solidFill>
+                  <a:schemeClr val="tx1"/>
+                </a:solidFill>
+                <a:latin typeface="+mn-lt"/>
+                <a:ea typeface="+mn-ea"/>
+                <a:cs typeface="+mn-cs"/>
+              </a:defRPr>
+            </a:lvl6pPr>
+            <a:lvl7pPr marL="2971800" indent="-228600" algn="l" defTabSz="914400" rtl="0" eaLnBrk="1" latinLnBrk="0" hangingPunct="1">
+              <a:lnSpc>
+                <a:spcPct val="90000"/>
+              </a:lnSpc>
+              <a:spcBef>
+                <a:spcPts val="500"/>
+              </a:spcBef>
+              <a:buFont typeface="Arial" panose="020B0604020202020204" pitchFamily="34" charset="0"/>
+              <a:buChar char="•"/>
+              <a:defRPr sz="1800" kern="1200">
+                <a:solidFill>
+                  <a:schemeClr val="tx1"/>
+                </a:solidFill>
+                <a:latin typeface="+mn-lt"/>
+                <a:ea typeface="+mn-ea"/>
+                <a:cs typeface="+mn-cs"/>
+              </a:defRPr>
+            </a:lvl7pPr>
+            <a:lvl8pPr marL="3429000" indent="-228600" algn="l" defTabSz="914400" rtl="0" eaLnBrk="1" latinLnBrk="0" hangingPunct="1">
+              <a:lnSpc>
+                <a:spcPct val="90000"/>
+              </a:lnSpc>
+              <a:spcBef>
+                <a:spcPts val="500"/>
+              </a:spcBef>
+              <a:buFont typeface="Arial" panose="020B0604020202020204" pitchFamily="34" charset="0"/>
+              <a:buChar char="•"/>
+              <a:defRPr sz="1800" kern="1200">
+                <a:solidFill>
+                  <a:schemeClr val="tx1"/>
+                </a:solidFill>
+                <a:latin typeface="+mn-lt"/>
+                <a:ea typeface="+mn-ea"/>
+                <a:cs typeface="+mn-cs"/>
+              </a:defRPr>
+            </a:lvl8pPr>
+            <a:lvl9pPr marL="3886200" indent="-228600" algn="l" defTabSz="914400" rtl="0" eaLnBrk="1" latinLnBrk="0" hangingPunct="1">
+              <a:lnSpc>
+                <a:spcPct val="90000"/>
+              </a:lnSpc>
+              <a:spcBef>
+                <a:spcPts val="500"/>
+              </a:spcBef>
+              <a:buFont typeface="Arial" panose="020B0604020202020204" pitchFamily="34" charset="0"/>
+              <a:buChar char="•"/>
+              <a:defRPr sz="1800" kern="1200">
+                <a:solidFill>
+                  <a:schemeClr val="tx1"/>
+                </a:solidFill>
+                <a:latin typeface="+mn-lt"/>
+                <a:ea typeface="+mn-ea"/>
+                <a:cs typeface="+mn-cs"/>
+              </a:defRPr>
+            </a:lvl9pPr>
+          </a:lstStyle>
           <a:p>
             <a:r>
               <a:rPr lang="en-US" dirty="0"/>
-              <a:t>Distance (meters)</a:t>
-            </a:r>
-          </a:p>
-        </p:txBody>
-      </p:sp>
-      <p:sp>
-        <p:nvSpPr>
-          <p:cNvPr id="11" name="TextBox 10">
-            <a:extLst>
-              <a:ext uri="{FF2B5EF4-FFF2-40B4-BE49-F238E27FC236}">
-                <a16:creationId xmlns:a16="http://schemas.microsoft.com/office/drawing/2014/main" id="{0BB15379-23A9-4A10-8343-D8386820BB42}"/>
-              </a:ext>
-            </a:extLst>
-          </p:cNvPr>
-          <p:cNvSpPr txBox="1"/>
-          <p:nvPr/>
-        </p:nvSpPr>
-        <p:spPr>
-          <a:xfrm rot="16200000">
-            <a:off x="4077769" y="2176941"/>
-            <a:ext cx="1265475" cy="369332"/>
-          </a:xfrm>
-          <a:prstGeom prst="rect">
-            <a:avLst/>
-          </a:prstGeom>
-          <a:noFill/>
-        </p:spPr>
-        <p:txBody>
-          <a:bodyPr wrap="none" rtlCol="0">
-            <a:spAutoFit/>
-          </a:bodyPr>
-          <a:lstStyle/>
-          <a:p>
+              <a:t>Table of contents:</a:t>
+            </a:r>
+          </a:p>
+          <a:p>
+            <a:pPr marL="514350" indent="-514350">
+              <a:buFont typeface="+mj-lt"/>
+              <a:buAutoNum type="arabicPeriod"/>
+            </a:pPr>
             <a:r>
               <a:rPr lang="en-US" dirty="0"/>
-              <a:t>Speed(m/s)</a:t>
-            </a:r>
-          </a:p>
-        </p:txBody>
-      </p:sp>
-      <p:pic>
-        <p:nvPicPr>
-          <p:cNvPr id="3" name="Picture 2">
-            <a:extLst>
-              <a:ext uri="{FF2B5EF4-FFF2-40B4-BE49-F238E27FC236}">
-                <a16:creationId xmlns:a16="http://schemas.microsoft.com/office/drawing/2014/main" id="{FE68E046-1FC8-4C8E-AB4A-76706FE3378D}"/>
-              </a:ext>
-            </a:extLst>
-          </p:cNvPr>
-          <p:cNvPicPr>
-            <a:picLocks noChangeAspect="1"/>
-          </p:cNvPicPr>
-          <p:nvPr/>
-        </p:nvPicPr>
-        <p:blipFill>
-          <a:blip r:embed="rId3"/>
-          <a:stretch>
-            <a:fillRect/>
-          </a:stretch>
-        </p:blipFill>
-        <p:spPr>
-          <a:xfrm>
-            <a:off x="347926" y="1014825"/>
-            <a:ext cx="3576314" cy="2393965"/>
-          </a:xfrm>
-          <a:prstGeom prst="rect">
-            <a:avLst/>
-          </a:prstGeom>
-        </p:spPr>
-      </p:pic>
-      <p:sp>
-        <p:nvSpPr>
-          <p:cNvPr id="13" name="TextBox 12">
-            <a:extLst>
-              <a:ext uri="{FF2B5EF4-FFF2-40B4-BE49-F238E27FC236}">
-                <a16:creationId xmlns:a16="http://schemas.microsoft.com/office/drawing/2014/main" id="{32086680-EC1D-4805-97A3-CDBA87475E1E}"/>
-              </a:ext>
-            </a:extLst>
-          </p:cNvPr>
-          <p:cNvSpPr txBox="1"/>
-          <p:nvPr/>
-        </p:nvSpPr>
-        <p:spPr>
-          <a:xfrm>
-            <a:off x="347926" y="3446167"/>
-            <a:ext cx="3572068" cy="369332"/>
-          </a:xfrm>
-          <a:prstGeom prst="rect">
-            <a:avLst/>
-          </a:prstGeom>
-          <a:noFill/>
-        </p:spPr>
-        <p:txBody>
-          <a:bodyPr wrap="none" rtlCol="0">
-            <a:spAutoFit/>
-          </a:bodyPr>
-          <a:lstStyle/>
-          <a:p>
+              <a:t>Power and drag characteristics</a:t>
+            </a:r>
+          </a:p>
+          <a:p>
+            <a:pPr marL="514350" indent="-514350">
+              <a:buFont typeface="+mj-lt"/>
+              <a:buAutoNum type="arabicPeriod"/>
+            </a:pPr>
             <a:r>
               <a:rPr lang="en-US" dirty="0"/>
-              <a:t>Testing data obtained from internet.</a:t>
-            </a:r>
-          </a:p>
-        </p:txBody>
-      </p:sp>
-      <p:sp>
-        <p:nvSpPr>
-          <p:cNvPr id="14" name="TextBox 13">
-            <a:extLst>
-              <a:ext uri="{FF2B5EF4-FFF2-40B4-BE49-F238E27FC236}">
-                <a16:creationId xmlns:a16="http://schemas.microsoft.com/office/drawing/2014/main" id="{3EB88EB9-E877-49B3-A2BD-6BCC90969C1D}"/>
-              </a:ext>
-            </a:extLst>
-          </p:cNvPr>
-          <p:cNvSpPr txBox="1"/>
-          <p:nvPr/>
-        </p:nvSpPr>
-        <p:spPr>
-          <a:xfrm>
-            <a:off x="5105270" y="451075"/>
-            <a:ext cx="5262466" cy="646331"/>
-          </a:xfrm>
-          <a:prstGeom prst="rect">
-            <a:avLst/>
-          </a:prstGeom>
-          <a:noFill/>
-        </p:spPr>
-        <p:txBody>
-          <a:bodyPr wrap="none" rtlCol="0">
-            <a:spAutoFit/>
-          </a:bodyPr>
-          <a:lstStyle/>
-          <a:p>
+              <a:t>Jumping and suspension behavior</a:t>
+            </a:r>
+          </a:p>
+          <a:p>
+            <a:pPr marL="514350" indent="-514350">
+              <a:buFont typeface="+mj-lt"/>
+              <a:buAutoNum type="arabicPeriod"/>
+            </a:pPr>
             <a:r>
               <a:rPr lang="en-US" dirty="0"/>
-              <a:t>Comparison between test data and model </a:t>
-            </a:r>
-          </a:p>
-          <a:p>
-            <a:r>
-              <a:rPr lang="en-US" dirty="0"/>
-              <a:t>(no learning agent, full throttle input to environment).</a:t>
-            </a:r>
-          </a:p>
-        </p:txBody>
-      </p:sp>
-      <p:pic>
-        <p:nvPicPr>
-          <p:cNvPr id="15" name="Picture 14">
-            <a:extLst>
-              <a:ext uri="{FF2B5EF4-FFF2-40B4-BE49-F238E27FC236}">
-                <a16:creationId xmlns:a16="http://schemas.microsoft.com/office/drawing/2014/main" id="{9F8A530C-C649-49FE-AB7F-E03DF309F284}"/>
-              </a:ext>
-            </a:extLst>
-          </p:cNvPr>
-          <p:cNvPicPr>
-            <a:picLocks noChangeAspect="1"/>
-          </p:cNvPicPr>
-          <p:nvPr/>
-        </p:nvPicPr>
-        <p:blipFill>
-          <a:blip r:embed="rId4"/>
-          <a:stretch>
-            <a:fillRect/>
-          </a:stretch>
-        </p:blipFill>
-        <p:spPr>
-          <a:xfrm>
-            <a:off x="347926" y="3976600"/>
-            <a:ext cx="3572068" cy="2536033"/>
-          </a:xfrm>
-          <a:prstGeom prst="rect">
-            <a:avLst/>
-          </a:prstGeom>
-        </p:spPr>
-      </p:pic>
-      <p:pic>
-        <p:nvPicPr>
-          <p:cNvPr id="16" name="Picture 15">
-            <a:extLst>
-              <a:ext uri="{FF2B5EF4-FFF2-40B4-BE49-F238E27FC236}">
-                <a16:creationId xmlns:a16="http://schemas.microsoft.com/office/drawing/2014/main" id="{AEF98570-5165-4700-8657-B91207F6F237}"/>
-              </a:ext>
-            </a:extLst>
-          </p:cNvPr>
-          <p:cNvPicPr>
-            <a:picLocks noChangeAspect="1"/>
-          </p:cNvPicPr>
-          <p:nvPr/>
-        </p:nvPicPr>
-        <p:blipFill>
-          <a:blip r:embed="rId5"/>
-          <a:stretch>
-            <a:fillRect/>
-          </a:stretch>
-        </p:blipFill>
-        <p:spPr>
-          <a:xfrm>
-            <a:off x="5042223" y="4160199"/>
-            <a:ext cx="3544908" cy="2644613"/>
-          </a:xfrm>
-          <a:prstGeom prst="rect">
-            <a:avLst/>
-          </a:prstGeom>
-        </p:spPr>
-      </p:pic>
-      <p:sp>
-        <p:nvSpPr>
-          <p:cNvPr id="17" name="TextBox 16">
-            <a:extLst>
-              <a:ext uri="{FF2B5EF4-FFF2-40B4-BE49-F238E27FC236}">
-                <a16:creationId xmlns:a16="http://schemas.microsoft.com/office/drawing/2014/main" id="{0A37D297-BCE9-4F5E-A833-8EDF62AF9792}"/>
-              </a:ext>
-            </a:extLst>
-          </p:cNvPr>
-          <p:cNvSpPr txBox="1"/>
-          <p:nvPr/>
-        </p:nvSpPr>
-        <p:spPr>
-          <a:xfrm rot="16200000">
-            <a:off x="4224820" y="5129356"/>
-            <a:ext cx="1265475" cy="369332"/>
-          </a:xfrm>
-          <a:prstGeom prst="rect">
-            <a:avLst/>
-          </a:prstGeom>
-          <a:noFill/>
-        </p:spPr>
-        <p:txBody>
-          <a:bodyPr wrap="none" rtlCol="0">
-            <a:spAutoFit/>
-          </a:bodyPr>
-          <a:lstStyle/>
-          <a:p>
-            <a:r>
-              <a:rPr lang="en-US" dirty="0"/>
-              <a:t>Speed(m/s)</a:t>
-            </a:r>
-          </a:p>
-        </p:txBody>
-      </p:sp>
-      <p:sp>
-        <p:nvSpPr>
-          <p:cNvPr id="18" name="TextBox 17">
-            <a:extLst>
-              <a:ext uri="{FF2B5EF4-FFF2-40B4-BE49-F238E27FC236}">
-                <a16:creationId xmlns:a16="http://schemas.microsoft.com/office/drawing/2014/main" id="{0F57DF6E-EC57-4D9D-8E0C-44E30B38E978}"/>
-              </a:ext>
-            </a:extLst>
-          </p:cNvPr>
-          <p:cNvSpPr txBox="1"/>
-          <p:nvPr/>
-        </p:nvSpPr>
-        <p:spPr>
-          <a:xfrm>
-            <a:off x="6041254" y="6037593"/>
-            <a:ext cx="933269" cy="369332"/>
-          </a:xfrm>
-          <a:prstGeom prst="rect">
-            <a:avLst/>
-          </a:prstGeom>
-          <a:noFill/>
-        </p:spPr>
-        <p:txBody>
-          <a:bodyPr wrap="none" rtlCol="0">
-            <a:spAutoFit/>
-          </a:bodyPr>
-          <a:lstStyle/>
-          <a:p>
-            <a:r>
-              <a:rPr lang="en-US" dirty="0"/>
-              <a:t>Time (s)</a:t>
+              <a:t>Drop test (not yet shown)</a:t>
             </a:r>
           </a:p>
         </p:txBody>
@@ -6812,7 +6937,7 @@
     </p:spTree>
     <p:extLst>
       <p:ext uri="{BB962C8B-B14F-4D97-AF65-F5344CB8AC3E}">
-        <p14:creationId xmlns:p14="http://schemas.microsoft.com/office/powerpoint/2010/main" val="1277321672"/>
+        <p14:creationId xmlns:p14="http://schemas.microsoft.com/office/powerpoint/2010/main" val="61192367"/>
       </p:ext>
     </p:extLst>
   </p:cSld>
@@ -6844,7 +6969,7 @@
           <p:cNvPr id="4" name="Picture 3">
             <a:extLst>
               <a:ext uri="{FF2B5EF4-FFF2-40B4-BE49-F238E27FC236}">
-                <a16:creationId xmlns:a16="http://schemas.microsoft.com/office/drawing/2014/main" id="{DAD635E4-D1E9-440E-856A-25A6F2AC923E}"/>
+                <a16:creationId xmlns:a16="http://schemas.microsoft.com/office/drawing/2014/main" id="{3EC3AE23-9574-4C3F-B754-E74299D67259}"/>
               </a:ext>
             </a:extLst>
           </p:cNvPr>
@@ -6861,20 +6986,126 @@
         </p:blipFill>
         <p:spPr>
           <a:xfrm>
-            <a:off x="111967" y="840256"/>
-            <a:ext cx="5605698" cy="2851516"/>
+            <a:off x="4779514" y="907345"/>
+            <a:ext cx="3870664" cy="2908154"/>
           </a:xfrm>
           <a:prstGeom prst="rect">
             <a:avLst/>
           </a:prstGeom>
         </p:spPr>
       </p:pic>
+      <p:sp>
+        <p:nvSpPr>
+          <p:cNvPr id="10" name="Subtitle 2">
+            <a:extLst>
+              <a:ext uri="{FF2B5EF4-FFF2-40B4-BE49-F238E27FC236}">
+                <a16:creationId xmlns:a16="http://schemas.microsoft.com/office/drawing/2014/main" id="{9A5F9AA3-2E5B-4F47-911C-CFA57DC44BFF}"/>
+              </a:ext>
+            </a:extLst>
+          </p:cNvPr>
+          <p:cNvSpPr>
+            <a:spLocks noGrp="1"/>
+          </p:cNvSpPr>
+          <p:nvPr>
+            <p:ph type="subTitle" idx="1"/>
+          </p:nvPr>
+        </p:nvSpPr>
+        <p:spPr>
+          <a:xfrm>
+            <a:off x="0" y="114223"/>
+            <a:ext cx="12082509" cy="2693632"/>
+          </a:xfrm>
+        </p:spPr>
+        <p:txBody>
+          <a:bodyPr>
+            <a:normAutofit/>
+          </a:bodyPr>
+          <a:lstStyle/>
+          <a:p>
+            <a:pPr algn="l"/>
+            <a:r>
+              <a:rPr lang="en-US" sz="1600" dirty="0"/>
+              <a:t>Environment validation. Is the environment realistic relative to a real supercross bike and track?</a:t>
+            </a:r>
+          </a:p>
+        </p:txBody>
+      </p:sp>
+      <p:sp>
+        <p:nvSpPr>
+          <p:cNvPr id="2" name="TextBox 1">
+            <a:extLst>
+              <a:ext uri="{FF2B5EF4-FFF2-40B4-BE49-F238E27FC236}">
+                <a16:creationId xmlns:a16="http://schemas.microsoft.com/office/drawing/2014/main" id="{2CF4C17D-2BE4-4404-BA20-025F8D3E4BCC}"/>
+              </a:ext>
+            </a:extLst>
+          </p:cNvPr>
+          <p:cNvSpPr txBox="1"/>
+          <p:nvPr/>
+        </p:nvSpPr>
+        <p:spPr>
+          <a:xfrm>
+            <a:off x="5901001" y="3235635"/>
+            <a:ext cx="1835502" cy="369332"/>
+          </a:xfrm>
+          <a:prstGeom prst="rect">
+            <a:avLst/>
+          </a:prstGeom>
+          <a:noFill/>
+        </p:spPr>
+        <p:txBody>
+          <a:bodyPr wrap="none" rtlCol="0">
+            <a:spAutoFit/>
+          </a:bodyPr>
+          <a:lstStyle/>
+          <a:p>
+            <a:r>
+              <a:rPr lang="en-US" dirty="0"/>
+              <a:t>Distance (meters)</a:t>
+            </a:r>
+          </a:p>
+        </p:txBody>
+      </p:sp>
+      <p:sp>
+        <p:nvSpPr>
+          <p:cNvPr id="11" name="TextBox 10">
+            <a:extLst>
+              <a:ext uri="{FF2B5EF4-FFF2-40B4-BE49-F238E27FC236}">
+                <a16:creationId xmlns:a16="http://schemas.microsoft.com/office/drawing/2014/main" id="{0BB15379-23A9-4A10-8343-D8386820BB42}"/>
+              </a:ext>
+            </a:extLst>
+          </p:cNvPr>
+          <p:cNvSpPr txBox="1"/>
+          <p:nvPr/>
+        </p:nvSpPr>
+        <p:spPr>
+          <a:xfrm rot="16200000">
+            <a:off x="4077769" y="2176941"/>
+            <a:ext cx="1265475" cy="369332"/>
+          </a:xfrm>
+          <a:prstGeom prst="rect">
+            <a:avLst/>
+          </a:prstGeom>
+          <a:noFill/>
+        </p:spPr>
+        <p:txBody>
+          <a:bodyPr wrap="none" rtlCol="0">
+            <a:spAutoFit/>
+          </a:bodyPr>
+          <a:lstStyle/>
+          <a:p>
+            <a:r>
+              <a:rPr lang="en-US" dirty="0"/>
+              <a:t>Speed(m/s)</a:t>
+            </a:r>
+          </a:p>
+        </p:txBody>
+      </p:sp>
       <p:pic>
         <p:nvPicPr>
-          <p:cNvPr id="5" name="Picture 4">
-            <a:extLst>
-              <a:ext uri="{FF2B5EF4-FFF2-40B4-BE49-F238E27FC236}">
-                <a16:creationId xmlns:a16="http://schemas.microsoft.com/office/drawing/2014/main" id="{F7E6F7A8-B52D-48D1-8870-E4BCFF5CD49D}"/>
+          <p:cNvPr id="3" name="Picture 2">
+            <a:extLst>
+              <a:ext uri="{FF2B5EF4-FFF2-40B4-BE49-F238E27FC236}">
+                <a16:creationId xmlns:a16="http://schemas.microsoft.com/office/drawing/2014/main" id="{FE68E046-1FC8-4C8E-AB4A-76706FE3378D}"/>
               </a:ext>
             </a:extLst>
           </p:cNvPr>
@@ -6891,8 +7122,8 @@
         </p:blipFill>
         <p:spPr>
           <a:xfrm>
-            <a:off x="6176864" y="840256"/>
-            <a:ext cx="5626360" cy="2851516"/>
+            <a:off x="347926" y="1014825"/>
+            <a:ext cx="3576314" cy="2393965"/>
           </a:xfrm>
           <a:prstGeom prst="rect">
             <a:avLst/>
@@ -6901,10 +7132,10 @@
       </p:pic>
       <p:sp>
         <p:nvSpPr>
-          <p:cNvPr id="6" name="TextBox 5">
-            <a:extLst>
-              <a:ext uri="{FF2B5EF4-FFF2-40B4-BE49-F238E27FC236}">
-                <a16:creationId xmlns:a16="http://schemas.microsoft.com/office/drawing/2014/main" id="{AC118E5B-42C7-4FD9-9997-8CF6C3253950}"/>
+          <p:cNvPr id="13" name="TextBox 12">
+            <a:extLst>
+              <a:ext uri="{FF2B5EF4-FFF2-40B4-BE49-F238E27FC236}">
+                <a16:creationId xmlns:a16="http://schemas.microsoft.com/office/drawing/2014/main" id="{32086680-EC1D-4805-97A3-CDBA87475E1E}"/>
               </a:ext>
             </a:extLst>
           </p:cNvPr>
@@ -6913,8 +7144,8 @@
         </p:nvSpPr>
         <p:spPr>
           <a:xfrm>
-            <a:off x="1045029" y="1318994"/>
-            <a:ext cx="1377300" cy="369332"/>
+            <a:off x="347926" y="3446167"/>
+            <a:ext cx="3572068" cy="369332"/>
           </a:xfrm>
           <a:prstGeom prst="rect">
             <a:avLst/>
@@ -6929,17 +7160,17 @@
           <a:p>
             <a:r>
               <a:rPr lang="en-US" dirty="0"/>
-              <a:t>10% and 10x</a:t>
-            </a:r>
-          </a:p>
-        </p:txBody>
-      </p:sp>
-      <p:sp>
-        <p:nvSpPr>
-          <p:cNvPr id="7" name="TextBox 6">
-            <a:extLst>
-              <a:ext uri="{FF2B5EF4-FFF2-40B4-BE49-F238E27FC236}">
-                <a16:creationId xmlns:a16="http://schemas.microsoft.com/office/drawing/2014/main" id="{A2B1AF72-9563-4BEA-AC0A-31343F8A22E9}"/>
+              <a:t>Testing data obtained from internet.</a:t>
+            </a:r>
+          </a:p>
+        </p:txBody>
+      </p:sp>
+      <p:sp>
+        <p:nvSpPr>
+          <p:cNvPr id="14" name="TextBox 13">
+            <a:extLst>
+              <a:ext uri="{FF2B5EF4-FFF2-40B4-BE49-F238E27FC236}">
+                <a16:creationId xmlns:a16="http://schemas.microsoft.com/office/drawing/2014/main" id="{3EB88EB9-E877-49B3-A2BD-6BCC90969C1D}"/>
               </a:ext>
             </a:extLst>
           </p:cNvPr>
@@ -6948,8 +7179,8 @@
         </p:nvSpPr>
         <p:spPr>
           <a:xfrm>
-            <a:off x="7128769" y="1318994"/>
-            <a:ext cx="1377300" cy="369332"/>
+            <a:off x="5105270" y="451075"/>
+            <a:ext cx="5262466" cy="646331"/>
           </a:xfrm>
           <a:prstGeom prst="rect">
             <a:avLst/>
@@ -6964,17 +7195,23 @@
           <a:p>
             <a:r>
               <a:rPr lang="en-US" dirty="0"/>
-              <a:t>30% and 10x</a:t>
+              <a:t>Comparison between test data and model </a:t>
+            </a:r>
+          </a:p>
+          <a:p>
+            <a:r>
+              <a:rPr lang="en-US" dirty="0"/>
+              <a:t>(no learning agent, full throttle input to environment).</a:t>
             </a:r>
           </a:p>
         </p:txBody>
       </p:sp>
       <p:pic>
         <p:nvPicPr>
-          <p:cNvPr id="8" name="Picture 7">
-            <a:extLst>
-              <a:ext uri="{FF2B5EF4-FFF2-40B4-BE49-F238E27FC236}">
-                <a16:creationId xmlns:a16="http://schemas.microsoft.com/office/drawing/2014/main" id="{A158987A-462C-4E50-9F05-5AAD4F84431E}"/>
+          <p:cNvPr id="15" name="Picture 14">
+            <a:extLst>
+              <a:ext uri="{FF2B5EF4-FFF2-40B4-BE49-F238E27FC236}">
+                <a16:creationId xmlns:a16="http://schemas.microsoft.com/office/drawing/2014/main" id="{9F8A530C-C649-49FE-AB7F-E03DF309F284}"/>
               </a:ext>
             </a:extLst>
           </p:cNvPr>
@@ -6991,55 +7228,20 @@
         </p:blipFill>
         <p:spPr>
           <a:xfrm>
-            <a:off x="91305" y="3922718"/>
-            <a:ext cx="5626360" cy="2854684"/>
+            <a:off x="347926" y="3976600"/>
+            <a:ext cx="3572068" cy="2536033"/>
           </a:xfrm>
           <a:prstGeom prst="rect">
             <a:avLst/>
           </a:prstGeom>
         </p:spPr>
       </p:pic>
-      <p:sp>
-        <p:nvSpPr>
-          <p:cNvPr id="9" name="TextBox 8">
-            <a:extLst>
-              <a:ext uri="{FF2B5EF4-FFF2-40B4-BE49-F238E27FC236}">
-                <a16:creationId xmlns:a16="http://schemas.microsoft.com/office/drawing/2014/main" id="{788A9C08-A3DF-4235-BA47-55E7A317EE5A}"/>
-              </a:ext>
-            </a:extLst>
-          </p:cNvPr>
-          <p:cNvSpPr txBox="1"/>
-          <p:nvPr/>
-        </p:nvSpPr>
-        <p:spPr>
-          <a:xfrm>
-            <a:off x="461215" y="4621487"/>
-            <a:ext cx="1377300" cy="369332"/>
-          </a:xfrm>
-          <a:prstGeom prst="rect">
-            <a:avLst/>
-          </a:prstGeom>
-          <a:noFill/>
-        </p:spPr>
-        <p:txBody>
-          <a:bodyPr wrap="none" rtlCol="0">
-            <a:spAutoFit/>
-          </a:bodyPr>
-          <a:lstStyle/>
-          <a:p>
-            <a:r>
-              <a:rPr lang="en-US" dirty="0"/>
-              <a:t>50% and 10x</a:t>
-            </a:r>
-          </a:p>
-        </p:txBody>
-      </p:sp>
       <p:pic>
         <p:nvPicPr>
-          <p:cNvPr id="10" name="Picture 9">
-            <a:extLst>
-              <a:ext uri="{FF2B5EF4-FFF2-40B4-BE49-F238E27FC236}">
-                <a16:creationId xmlns:a16="http://schemas.microsoft.com/office/drawing/2014/main" id="{255E3642-54B9-4B08-A343-E730E6802B7A}"/>
+          <p:cNvPr id="16" name="Picture 15">
+            <a:extLst>
+              <a:ext uri="{FF2B5EF4-FFF2-40B4-BE49-F238E27FC236}">
+                <a16:creationId xmlns:a16="http://schemas.microsoft.com/office/drawing/2014/main" id="{AEF98570-5165-4700-8657-B91207F6F237}"/>
               </a:ext>
             </a:extLst>
           </p:cNvPr>
@@ -7056,8 +7258,8 @@
         </p:blipFill>
         <p:spPr>
           <a:xfrm>
-            <a:off x="6176864" y="3922718"/>
-            <a:ext cx="5633838" cy="2851516"/>
+            <a:off x="5042223" y="4160199"/>
+            <a:ext cx="3544908" cy="2644613"/>
           </a:xfrm>
           <a:prstGeom prst="rect">
             <a:avLst/>
@@ -7066,10 +7268,10 @@
       </p:pic>
       <p:sp>
         <p:nvSpPr>
-          <p:cNvPr id="11" name="TextBox 10">
-            <a:extLst>
-              <a:ext uri="{FF2B5EF4-FFF2-40B4-BE49-F238E27FC236}">
-                <a16:creationId xmlns:a16="http://schemas.microsoft.com/office/drawing/2014/main" id="{2BE5EC9A-BB7B-4891-A106-FBCCF58C7D40}"/>
+          <p:cNvPr id="17" name="TextBox 16">
+            <a:extLst>
+              <a:ext uri="{FF2B5EF4-FFF2-40B4-BE49-F238E27FC236}">
+                <a16:creationId xmlns:a16="http://schemas.microsoft.com/office/drawing/2014/main" id="{0A37D297-BCE9-4F5E-A833-8EDF62AF9792}"/>
               </a:ext>
             </a:extLst>
           </p:cNvPr>
@@ -7077,9 +7279,9 @@
           <p:nvPr/>
         </p:nvSpPr>
         <p:spPr>
-          <a:xfrm>
-            <a:off x="6381192" y="4497070"/>
-            <a:ext cx="2872453" cy="646331"/>
+          <a:xfrm rot="16200000">
+            <a:off x="4224820" y="5129356"/>
+            <a:ext cx="1265475" cy="369332"/>
           </a:xfrm>
           <a:prstGeom prst="rect">
             <a:avLst/>
@@ -7094,23 +7296,17 @@
           <a:p>
             <a:r>
               <a:rPr lang="en-US" dirty="0"/>
-              <a:t>30% and 5x</a:t>
-            </a:r>
-          </a:p>
-          <a:p>
-            <a:r>
-              <a:rPr lang="en-US" dirty="0"/>
-              <a:t>Selected by visual inspection</a:t>
-            </a:r>
-          </a:p>
-        </p:txBody>
-      </p:sp>
-      <p:sp>
-        <p:nvSpPr>
-          <p:cNvPr id="13" name="TextBox 12">
-            <a:extLst>
-              <a:ext uri="{FF2B5EF4-FFF2-40B4-BE49-F238E27FC236}">
-                <a16:creationId xmlns:a16="http://schemas.microsoft.com/office/drawing/2014/main" id="{0A1D916B-5321-4DAF-BBCA-BBD6E8035DB3}"/>
+              <a:t>Speed(m/s)</a:t>
+            </a:r>
+          </a:p>
+        </p:txBody>
+      </p:sp>
+      <p:sp>
+        <p:nvSpPr>
+          <p:cNvPr id="18" name="TextBox 17">
+            <a:extLst>
+              <a:ext uri="{FF2B5EF4-FFF2-40B4-BE49-F238E27FC236}">
+                <a16:creationId xmlns:a16="http://schemas.microsoft.com/office/drawing/2014/main" id="{0F57DF6E-EC57-4D9D-8E0C-44E30B38E978}"/>
               </a:ext>
             </a:extLst>
           </p:cNvPr>
@@ -7119,8 +7315,8 @@
         </p:nvSpPr>
         <p:spPr>
           <a:xfrm>
-            <a:off x="301514" y="80598"/>
-            <a:ext cx="8342284" cy="646331"/>
+            <a:off x="6041254" y="6037593"/>
+            <a:ext cx="933269" cy="369332"/>
           </a:xfrm>
           <a:prstGeom prst="rect">
             <a:avLst/>
@@ -7135,13 +7331,7 @@
           <a:p>
             <a:r>
               <a:rPr lang="en-US" dirty="0"/>
-              <a:t>Exploring the behavior of progressive suspension stiffness. </a:t>
-            </a:r>
-          </a:p>
-          <a:p>
-            <a:r>
-              <a:rPr lang="en-US" dirty="0"/>
-              <a:t>As suspension nears bottoming, ramp up stiffness [1x -&gt; ?x] as travel goes [?% -&gt; 100%]</a:t>
+              <a:t>Time (s)</a:t>
             </a:r>
           </a:p>
         </p:txBody>
@@ -7149,7 +7339,7 @@
     </p:spTree>
     <p:extLst>
       <p:ext uri="{BB962C8B-B14F-4D97-AF65-F5344CB8AC3E}">
-        <p14:creationId xmlns:p14="http://schemas.microsoft.com/office/powerpoint/2010/main" val="1715432543"/>
+        <p14:creationId xmlns:p14="http://schemas.microsoft.com/office/powerpoint/2010/main" val="1277321672"/>
       </p:ext>
     </p:extLst>
   </p:cSld>
@@ -7176,50 +7366,309 @@
           <a:chExt cx="0" cy="0"/>
         </a:xfrm>
       </p:grpSpPr>
-      <p:sp>
-        <p:nvSpPr>
-          <p:cNvPr id="2" name="Title 1">
-            <a:extLst>
-              <a:ext uri="{FF2B5EF4-FFF2-40B4-BE49-F238E27FC236}">
-                <a16:creationId xmlns:a16="http://schemas.microsoft.com/office/drawing/2014/main" id="{324E0CB4-7CDA-4FDF-AB0C-39C5AAB36034}"/>
-              </a:ext>
-            </a:extLst>
-          </p:cNvPr>
-          <p:cNvSpPr>
-            <a:spLocks noGrp="1"/>
-          </p:cNvSpPr>
-          <p:nvPr>
-            <p:ph type="title"/>
-          </p:nvPr>
-        </p:nvSpPr>
-        <p:spPr/>
-        <p:txBody>
-          <a:bodyPr>
-            <a:normAutofit fontScale="90000"/>
+      <p:pic>
+        <p:nvPicPr>
+          <p:cNvPr id="4" name="Picture 3">
+            <a:extLst>
+              <a:ext uri="{FF2B5EF4-FFF2-40B4-BE49-F238E27FC236}">
+                <a16:creationId xmlns:a16="http://schemas.microsoft.com/office/drawing/2014/main" id="{DAD635E4-D1E9-440E-856A-25A6F2AC923E}"/>
+              </a:ext>
+            </a:extLst>
+          </p:cNvPr>
+          <p:cNvPicPr>
+            <a:picLocks noChangeAspect="1"/>
+          </p:cNvPicPr>
+          <p:nvPr/>
+        </p:nvPicPr>
+        <p:blipFill>
+          <a:blip r:embed="rId2"/>
+          <a:stretch>
+            <a:fillRect/>
+          </a:stretch>
+        </p:blipFill>
+        <p:spPr>
+          <a:xfrm>
+            <a:off x="111967" y="840256"/>
+            <a:ext cx="5605698" cy="2851516"/>
+          </a:xfrm>
+          <a:prstGeom prst="rect">
+            <a:avLst/>
+          </a:prstGeom>
+        </p:spPr>
+      </p:pic>
+      <p:pic>
+        <p:nvPicPr>
+          <p:cNvPr id="5" name="Picture 4">
+            <a:extLst>
+              <a:ext uri="{FF2B5EF4-FFF2-40B4-BE49-F238E27FC236}">
+                <a16:creationId xmlns:a16="http://schemas.microsoft.com/office/drawing/2014/main" id="{F7E6F7A8-B52D-48D1-8870-E4BCFF5CD49D}"/>
+              </a:ext>
+            </a:extLst>
+          </p:cNvPr>
+          <p:cNvPicPr>
+            <a:picLocks noChangeAspect="1"/>
+          </p:cNvPicPr>
+          <p:nvPr/>
+        </p:nvPicPr>
+        <p:blipFill>
+          <a:blip r:embed="rId3"/>
+          <a:stretch>
+            <a:fillRect/>
+          </a:stretch>
+        </p:blipFill>
+        <p:spPr>
+          <a:xfrm>
+            <a:off x="6176864" y="840256"/>
+            <a:ext cx="5626360" cy="2851516"/>
+          </a:xfrm>
+          <a:prstGeom prst="rect">
+            <a:avLst/>
+          </a:prstGeom>
+        </p:spPr>
+      </p:pic>
+      <p:sp>
+        <p:nvSpPr>
+          <p:cNvPr id="6" name="TextBox 5">
+            <a:extLst>
+              <a:ext uri="{FF2B5EF4-FFF2-40B4-BE49-F238E27FC236}">
+                <a16:creationId xmlns:a16="http://schemas.microsoft.com/office/drawing/2014/main" id="{AC118E5B-42C7-4FD9-9997-8CF6C3253950}"/>
+              </a:ext>
+            </a:extLst>
+          </p:cNvPr>
+          <p:cNvSpPr txBox="1"/>
+          <p:nvPr/>
+        </p:nvSpPr>
+        <p:spPr>
+          <a:xfrm>
+            <a:off x="1045029" y="1318994"/>
+            <a:ext cx="1377300" cy="369332"/>
+          </a:xfrm>
+          <a:prstGeom prst="rect">
+            <a:avLst/>
+          </a:prstGeom>
+          <a:noFill/>
+        </p:spPr>
+        <p:txBody>
+          <a:bodyPr wrap="none" rtlCol="0">
+            <a:spAutoFit/>
           </a:bodyPr>
           <a:lstStyle/>
           <a:p>
             <a:r>
               <a:rPr lang="en-US" dirty="0"/>
-              <a:t>Description of .</a:t>
-            </a:r>
-            <a:r>
-              <a:rPr lang="en-US" dirty="0" err="1"/>
-              <a:t>py</a:t>
-            </a:r>
+              <a:t>10% and 10x</a:t>
+            </a:r>
+          </a:p>
+        </p:txBody>
+      </p:sp>
+      <p:sp>
+        <p:nvSpPr>
+          <p:cNvPr id="7" name="TextBox 6">
+            <a:extLst>
+              <a:ext uri="{FF2B5EF4-FFF2-40B4-BE49-F238E27FC236}">
+                <a16:creationId xmlns:a16="http://schemas.microsoft.com/office/drawing/2014/main" id="{A2B1AF72-9563-4BEA-AC0A-31343F8A22E9}"/>
+              </a:ext>
+            </a:extLst>
+          </p:cNvPr>
+          <p:cNvSpPr txBox="1"/>
+          <p:nvPr/>
+        </p:nvSpPr>
+        <p:spPr>
+          <a:xfrm>
+            <a:off x="7128769" y="1318994"/>
+            <a:ext cx="1377300" cy="369332"/>
+          </a:xfrm>
+          <a:prstGeom prst="rect">
+            <a:avLst/>
+          </a:prstGeom>
+          <a:noFill/>
+        </p:spPr>
+        <p:txBody>
+          <a:bodyPr wrap="none" rtlCol="0">
+            <a:spAutoFit/>
+          </a:bodyPr>
+          <a:lstStyle/>
+          <a:p>
             <a:r>
               <a:rPr lang="en-US" dirty="0"/>
-              <a:t> file interaction</a:t>
-            </a:r>
-            <a:br>
+              <a:t>30% and 10x</a:t>
+            </a:r>
+          </a:p>
+        </p:txBody>
+      </p:sp>
+      <p:pic>
+        <p:nvPicPr>
+          <p:cNvPr id="8" name="Picture 7">
+            <a:extLst>
+              <a:ext uri="{FF2B5EF4-FFF2-40B4-BE49-F238E27FC236}">
+                <a16:creationId xmlns:a16="http://schemas.microsoft.com/office/drawing/2014/main" id="{A158987A-462C-4E50-9F05-5AAD4F84431E}"/>
+              </a:ext>
+            </a:extLst>
+          </p:cNvPr>
+          <p:cNvPicPr>
+            <a:picLocks noChangeAspect="1"/>
+          </p:cNvPicPr>
+          <p:nvPr/>
+        </p:nvPicPr>
+        <p:blipFill>
+          <a:blip r:embed="rId4"/>
+          <a:stretch>
+            <a:fillRect/>
+          </a:stretch>
+        </p:blipFill>
+        <p:spPr>
+          <a:xfrm>
+            <a:off x="91305" y="3922718"/>
+            <a:ext cx="5626360" cy="2854684"/>
+          </a:xfrm>
+          <a:prstGeom prst="rect">
+            <a:avLst/>
+          </a:prstGeom>
+        </p:spPr>
+      </p:pic>
+      <p:sp>
+        <p:nvSpPr>
+          <p:cNvPr id="9" name="TextBox 8">
+            <a:extLst>
+              <a:ext uri="{FF2B5EF4-FFF2-40B4-BE49-F238E27FC236}">
+                <a16:creationId xmlns:a16="http://schemas.microsoft.com/office/drawing/2014/main" id="{788A9C08-A3DF-4235-BA47-55E7A317EE5A}"/>
+              </a:ext>
+            </a:extLst>
+          </p:cNvPr>
+          <p:cNvSpPr txBox="1"/>
+          <p:nvPr/>
+        </p:nvSpPr>
+        <p:spPr>
+          <a:xfrm>
+            <a:off x="461215" y="4621487"/>
+            <a:ext cx="1377300" cy="369332"/>
+          </a:xfrm>
+          <a:prstGeom prst="rect">
+            <a:avLst/>
+          </a:prstGeom>
+          <a:noFill/>
+        </p:spPr>
+        <p:txBody>
+          <a:bodyPr wrap="none" rtlCol="0">
+            <a:spAutoFit/>
+          </a:bodyPr>
+          <a:lstStyle/>
+          <a:p>
+            <a:r>
               <a:rPr lang="en-US" dirty="0"/>
-            </a:br>
-            <a:br>
+              <a:t>50% and 10x</a:t>
+            </a:r>
+          </a:p>
+        </p:txBody>
+      </p:sp>
+      <p:pic>
+        <p:nvPicPr>
+          <p:cNvPr id="10" name="Picture 9">
+            <a:extLst>
+              <a:ext uri="{FF2B5EF4-FFF2-40B4-BE49-F238E27FC236}">
+                <a16:creationId xmlns:a16="http://schemas.microsoft.com/office/drawing/2014/main" id="{255E3642-54B9-4B08-A343-E730E6802B7A}"/>
+              </a:ext>
+            </a:extLst>
+          </p:cNvPr>
+          <p:cNvPicPr>
+            <a:picLocks noChangeAspect="1"/>
+          </p:cNvPicPr>
+          <p:nvPr/>
+        </p:nvPicPr>
+        <p:blipFill>
+          <a:blip r:embed="rId5"/>
+          <a:stretch>
+            <a:fillRect/>
+          </a:stretch>
+        </p:blipFill>
+        <p:spPr>
+          <a:xfrm>
+            <a:off x="6176864" y="3922718"/>
+            <a:ext cx="5633838" cy="2851516"/>
+          </a:xfrm>
+          <a:prstGeom prst="rect">
+            <a:avLst/>
+          </a:prstGeom>
+        </p:spPr>
+      </p:pic>
+      <p:sp>
+        <p:nvSpPr>
+          <p:cNvPr id="11" name="TextBox 10">
+            <a:extLst>
+              <a:ext uri="{FF2B5EF4-FFF2-40B4-BE49-F238E27FC236}">
+                <a16:creationId xmlns:a16="http://schemas.microsoft.com/office/drawing/2014/main" id="{2BE5EC9A-BB7B-4891-A106-FBCCF58C7D40}"/>
+              </a:ext>
+            </a:extLst>
+          </p:cNvPr>
+          <p:cNvSpPr txBox="1"/>
+          <p:nvPr/>
+        </p:nvSpPr>
+        <p:spPr>
+          <a:xfrm>
+            <a:off x="6381192" y="4497070"/>
+            <a:ext cx="2872453" cy="646331"/>
+          </a:xfrm>
+          <a:prstGeom prst="rect">
+            <a:avLst/>
+          </a:prstGeom>
+          <a:noFill/>
+        </p:spPr>
+        <p:txBody>
+          <a:bodyPr wrap="none" rtlCol="0">
+            <a:spAutoFit/>
+          </a:bodyPr>
+          <a:lstStyle/>
+          <a:p>
+            <a:r>
               <a:rPr lang="en-US" dirty="0"/>
-            </a:br>
+              <a:t>30% and 5x</a:t>
+            </a:r>
+          </a:p>
+          <a:p>
             <a:r>
               <a:rPr lang="en-US" dirty="0"/>
-              <a:t>NOT DONE</a:t>
+              <a:t>Selected by visual inspection</a:t>
+            </a:r>
+          </a:p>
+        </p:txBody>
+      </p:sp>
+      <p:sp>
+        <p:nvSpPr>
+          <p:cNvPr id="13" name="TextBox 12">
+            <a:extLst>
+              <a:ext uri="{FF2B5EF4-FFF2-40B4-BE49-F238E27FC236}">
+                <a16:creationId xmlns:a16="http://schemas.microsoft.com/office/drawing/2014/main" id="{0A1D916B-5321-4DAF-BBCA-BBD6E8035DB3}"/>
+              </a:ext>
+            </a:extLst>
+          </p:cNvPr>
+          <p:cNvSpPr txBox="1"/>
+          <p:nvPr/>
+        </p:nvSpPr>
+        <p:spPr>
+          <a:xfrm>
+            <a:off x="301514" y="80598"/>
+            <a:ext cx="8342284" cy="646331"/>
+          </a:xfrm>
+          <a:prstGeom prst="rect">
+            <a:avLst/>
+          </a:prstGeom>
+          <a:noFill/>
+        </p:spPr>
+        <p:txBody>
+          <a:bodyPr wrap="none" rtlCol="0">
+            <a:spAutoFit/>
+          </a:bodyPr>
+          <a:lstStyle/>
+          <a:p>
+            <a:r>
+              <a:rPr lang="en-US" dirty="0"/>
+              <a:t>Exploring the behavior of progressive suspension stiffness. </a:t>
+            </a:r>
+          </a:p>
+          <a:p>
+            <a:r>
+              <a:rPr lang="en-US" dirty="0"/>
+              <a:t>As suspension nears bottoming, ramp up stiffness [1x -&gt; ?x] as travel goes [?% -&gt; 100%]</a:t>
             </a:r>
           </a:p>
         </p:txBody>
@@ -7227,7 +7676,7 @@
     </p:spTree>
     <p:extLst>
       <p:ext uri="{BB962C8B-B14F-4D97-AF65-F5344CB8AC3E}">
-        <p14:creationId xmlns:p14="http://schemas.microsoft.com/office/powerpoint/2010/main" val="2145577619"/>
+        <p14:creationId xmlns:p14="http://schemas.microsoft.com/office/powerpoint/2010/main" val="1715432543"/>
       </p:ext>
     </p:extLst>
   </p:cSld>
@@ -7272,12 +7721,32 @@
         </p:nvSpPr>
         <p:spPr/>
         <p:txBody>
-          <a:bodyPr/>
+          <a:bodyPr>
+            <a:normAutofit fontScale="90000"/>
+          </a:bodyPr>
           <a:lstStyle/>
           <a:p>
             <a:r>
               <a:rPr lang="en-US" dirty="0"/>
-              <a:t>Section for progress of the learner</a:t>
+              <a:t>Description of .</a:t>
+            </a:r>
+            <a:r>
+              <a:rPr lang="en-US" dirty="0" err="1"/>
+              <a:t>py</a:t>
+            </a:r>
+            <a:r>
+              <a:rPr lang="en-US" dirty="0"/>
+              <a:t> file interaction</a:t>
+            </a:r>
+            <a:br>
+              <a:rPr lang="en-US" dirty="0"/>
+            </a:br>
+            <a:br>
+              <a:rPr lang="en-US" dirty="0"/>
+            </a:br>
+            <a:r>
+              <a:rPr lang="en-US" dirty="0"/>
+              <a:t>NOT DONE</a:t>
             </a:r>
           </a:p>
         </p:txBody>
@@ -7285,7 +7754,7 @@
     </p:spTree>
     <p:extLst>
       <p:ext uri="{BB962C8B-B14F-4D97-AF65-F5344CB8AC3E}">
-        <p14:creationId xmlns:p14="http://schemas.microsoft.com/office/powerpoint/2010/main" val="557255703"/>
+        <p14:creationId xmlns:p14="http://schemas.microsoft.com/office/powerpoint/2010/main" val="2145577619"/>
       </p:ext>
     </p:extLst>
   </p:cSld>
@@ -7317,7 +7786,7 @@
           <p:cNvPr id="2" name="Title 1">
             <a:extLst>
               <a:ext uri="{FF2B5EF4-FFF2-40B4-BE49-F238E27FC236}">
-                <a16:creationId xmlns:a16="http://schemas.microsoft.com/office/drawing/2014/main" id="{A694CACF-DA40-4BB6-86BE-61D735641D6A}"/>
+                <a16:creationId xmlns:a16="http://schemas.microsoft.com/office/drawing/2014/main" id="{324E0CB4-7CDA-4FDF-AB0C-39C5AAB36034}"/>
               </a:ext>
             </a:extLst>
           </p:cNvPr>
@@ -7328,135 +7797,22 @@
             <p:ph type="title"/>
           </p:nvPr>
         </p:nvSpPr>
-        <p:spPr>
-          <a:xfrm>
-            <a:off x="0" y="-115434"/>
-            <a:ext cx="10515600" cy="1325563"/>
-          </a:xfrm>
-        </p:spPr>
+        <p:spPr/>
         <p:txBody>
           <a:bodyPr/>
           <a:lstStyle/>
           <a:p>
             <a:r>
               <a:rPr lang="en-US" dirty="0"/>
-              <a:t>First success with </a:t>
-            </a:r>
-            <a:r>
-              <a:rPr lang="en-US" dirty="0" err="1"/>
-              <a:t>tensorForce</a:t>
-            </a:r>
-            <a:endParaRPr lang="en-US" dirty="0"/>
-          </a:p>
-        </p:txBody>
-      </p:sp>
-      <p:sp>
-        <p:nvSpPr>
-          <p:cNvPr id="3" name="Content Placeholder 2">
-            <a:extLst>
-              <a:ext uri="{FF2B5EF4-FFF2-40B4-BE49-F238E27FC236}">
-                <a16:creationId xmlns:a16="http://schemas.microsoft.com/office/drawing/2014/main" id="{B63D27CD-0D37-4F82-82F3-86DA6C78278E}"/>
-              </a:ext>
-            </a:extLst>
-          </p:cNvPr>
-          <p:cNvSpPr>
-            <a:spLocks noGrp="1"/>
-          </p:cNvSpPr>
-          <p:nvPr>
-            <p:ph idx="1"/>
-          </p:nvPr>
-        </p:nvSpPr>
-        <p:spPr>
-          <a:xfrm>
-            <a:off x="123041" y="760556"/>
-            <a:ext cx="10515600" cy="4351338"/>
-          </a:xfrm>
-        </p:spPr>
-        <p:txBody>
-          <a:bodyPr>
-            <a:normAutofit/>
-          </a:bodyPr>
-          <a:lstStyle/>
-          <a:p>
-            <a:r>
-              <a:rPr lang="en-US" sz="1200" dirty="0"/>
-              <a:t>Uses default PPO agent from </a:t>
-            </a:r>
-            <a:r>
-              <a:rPr lang="en-US" sz="1200" dirty="0" err="1"/>
-              <a:t>OpenAI</a:t>
-            </a:r>
-            <a:r>
-              <a:rPr lang="en-US" sz="1200" dirty="0"/>
-              <a:t> gym Cart Pole example.</a:t>
-            </a:r>
-          </a:p>
-          <a:p>
-            <a:r>
-              <a:rPr lang="en-US" sz="1200" dirty="0"/>
-              <a:t>Env is just the track with single triple jump (i.e. mk_trk1()). Plot show throttle and bike X position vs time.</a:t>
-            </a:r>
-          </a:p>
-          <a:p>
-            <a:r>
-              <a:rPr lang="en-US" sz="1200" dirty="0"/>
-              <a:t>We can see the trend towards more full throttle, not rolling backwards on jump face. Still some ambiguity with what to do at start. Obviously because it only see 30m ahead, and 30m ahead of start there is nothing. But what's nice about that is we see that as soon as it does see a feature like jump face, high throttle actions predominate.</a:t>
-            </a:r>
-          </a:p>
-          <a:p>
-            <a:r>
-              <a:rPr lang="en-US" sz="1200" dirty="0"/>
-              <a:t>Reward at ep3000=3.4</a:t>
-            </a:r>
-          </a:p>
-          <a:p>
-            <a:r>
-              <a:rPr lang="en-US" sz="1200" dirty="0"/>
-              <a:t>Best reward =4.1</a:t>
-            </a:r>
-          </a:p>
-          <a:p>
-            <a:r>
-              <a:rPr lang="en-US" sz="1200" dirty="0"/>
-              <a:t>Worst reward = approx. -1e6</a:t>
-            </a:r>
-          </a:p>
-        </p:txBody>
-      </p:sp>
-      <p:pic>
-        <p:nvPicPr>
-          <p:cNvPr id="5" name="Picture 4">
-            <a:extLst>
-              <a:ext uri="{FF2B5EF4-FFF2-40B4-BE49-F238E27FC236}">
-                <a16:creationId xmlns:a16="http://schemas.microsoft.com/office/drawing/2014/main" id="{53A80669-8EDD-4B2B-B6DE-09D9114F95E3}"/>
-              </a:ext>
-            </a:extLst>
-          </p:cNvPr>
-          <p:cNvPicPr>
-            <a:picLocks noChangeAspect="1"/>
-          </p:cNvPicPr>
-          <p:nvPr/>
-        </p:nvPicPr>
-        <p:blipFill>
-          <a:blip r:embed="rId2"/>
-          <a:stretch>
-            <a:fillRect/>
-          </a:stretch>
-        </p:blipFill>
-        <p:spPr>
-          <a:xfrm>
-            <a:off x="2296885" y="1764380"/>
-            <a:ext cx="9895115" cy="5093620"/>
-          </a:xfrm>
-          <a:prstGeom prst="rect">
-            <a:avLst/>
-          </a:prstGeom>
-        </p:spPr>
-      </p:pic>
+              <a:t>Section for progress of the learner</a:t>
+            </a:r>
+          </a:p>
+        </p:txBody>
+      </p:sp>
     </p:spTree>
     <p:extLst>
       <p:ext uri="{BB962C8B-B14F-4D97-AF65-F5344CB8AC3E}">
-        <p14:creationId xmlns:p14="http://schemas.microsoft.com/office/powerpoint/2010/main" val="2794760790"/>
+        <p14:creationId xmlns:p14="http://schemas.microsoft.com/office/powerpoint/2010/main" val="557255703"/>
       </p:ext>
     </p:extLst>
   </p:cSld>

</xml_diff>

<commit_message>
improve performance tracking and plotting for set of tracks
</commit_message>
<xml_diff>
--- a/supercross_learner/supercross_project_readme.pptx
+++ b/supercross_learner/supercross_project_readme.pptx
@@ -19,7 +19,8 @@
     <p:sldId id="267" r:id="rId13"/>
     <p:sldId id="268" r:id="rId14"/>
     <p:sldId id="274" r:id="rId15"/>
-    <p:sldId id="266" r:id="rId16"/>
+    <p:sldId id="276" r:id="rId16"/>
+    <p:sldId id="266" r:id="rId17"/>
   </p:sldIdLst>
   <p:sldSz cx="12192000" cy="6858000"/>
   <p:notesSz cx="6858000" cy="9144000"/>
@@ -273,7 +274,7 @@
           <a:p>
             <a:fld id="{C15FC8A3-6A92-4D25-A62C-09A6E434F930}" type="datetimeFigureOut">
               <a:rPr lang="en-US" smtClean="0"/>
-              <a:t>6/10/2019</a:t>
+              <a:t>6/11/2019</a:t>
             </a:fld>
             <a:endParaRPr lang="en-US"/>
           </a:p>
@@ -471,7 +472,7 @@
           <a:p>
             <a:fld id="{C15FC8A3-6A92-4D25-A62C-09A6E434F930}" type="datetimeFigureOut">
               <a:rPr lang="en-US" smtClean="0"/>
-              <a:t>6/10/2019</a:t>
+              <a:t>6/11/2019</a:t>
             </a:fld>
             <a:endParaRPr lang="en-US"/>
           </a:p>
@@ -679,7 +680,7 @@
           <a:p>
             <a:fld id="{C15FC8A3-6A92-4D25-A62C-09A6E434F930}" type="datetimeFigureOut">
               <a:rPr lang="en-US" smtClean="0"/>
-              <a:t>6/10/2019</a:t>
+              <a:t>6/11/2019</a:t>
             </a:fld>
             <a:endParaRPr lang="en-US"/>
           </a:p>
@@ -877,7 +878,7 @@
           <a:p>
             <a:fld id="{C15FC8A3-6A92-4D25-A62C-09A6E434F930}" type="datetimeFigureOut">
               <a:rPr lang="en-US" smtClean="0"/>
-              <a:t>6/10/2019</a:t>
+              <a:t>6/11/2019</a:t>
             </a:fld>
             <a:endParaRPr lang="en-US"/>
           </a:p>
@@ -1152,7 +1153,7 @@
           <a:p>
             <a:fld id="{C15FC8A3-6A92-4D25-A62C-09A6E434F930}" type="datetimeFigureOut">
               <a:rPr lang="en-US" smtClean="0"/>
-              <a:t>6/10/2019</a:t>
+              <a:t>6/11/2019</a:t>
             </a:fld>
             <a:endParaRPr lang="en-US"/>
           </a:p>
@@ -1417,7 +1418,7 @@
           <a:p>
             <a:fld id="{C15FC8A3-6A92-4D25-A62C-09A6E434F930}" type="datetimeFigureOut">
               <a:rPr lang="en-US" smtClean="0"/>
-              <a:t>6/10/2019</a:t>
+              <a:t>6/11/2019</a:t>
             </a:fld>
             <a:endParaRPr lang="en-US"/>
           </a:p>
@@ -1829,7 +1830,7 @@
           <a:p>
             <a:fld id="{C15FC8A3-6A92-4D25-A62C-09A6E434F930}" type="datetimeFigureOut">
               <a:rPr lang="en-US" smtClean="0"/>
-              <a:t>6/10/2019</a:t>
+              <a:t>6/11/2019</a:t>
             </a:fld>
             <a:endParaRPr lang="en-US"/>
           </a:p>
@@ -1970,7 +1971,7 @@
           <a:p>
             <a:fld id="{C15FC8A3-6A92-4D25-A62C-09A6E434F930}" type="datetimeFigureOut">
               <a:rPr lang="en-US" smtClean="0"/>
-              <a:t>6/10/2019</a:t>
+              <a:t>6/11/2019</a:t>
             </a:fld>
             <a:endParaRPr lang="en-US"/>
           </a:p>
@@ -2083,7 +2084,7 @@
           <a:p>
             <a:fld id="{C15FC8A3-6A92-4D25-A62C-09A6E434F930}" type="datetimeFigureOut">
               <a:rPr lang="en-US" smtClean="0"/>
-              <a:t>6/10/2019</a:t>
+              <a:t>6/11/2019</a:t>
             </a:fld>
             <a:endParaRPr lang="en-US"/>
           </a:p>
@@ -2394,7 +2395,7 @@
           <a:p>
             <a:fld id="{C15FC8A3-6A92-4D25-A62C-09A6E434F930}" type="datetimeFigureOut">
               <a:rPr lang="en-US" smtClean="0"/>
-              <a:t>6/10/2019</a:t>
+              <a:t>6/11/2019</a:t>
             </a:fld>
             <a:endParaRPr lang="en-US"/>
           </a:p>
@@ -2682,7 +2683,7 @@
           <a:p>
             <a:fld id="{C15FC8A3-6A92-4D25-A62C-09A6E434F930}" type="datetimeFigureOut">
               <a:rPr lang="en-US" smtClean="0"/>
-              <a:t>6/10/2019</a:t>
+              <a:t>6/11/2019</a:t>
             </a:fld>
             <a:endParaRPr lang="en-US"/>
           </a:p>
@@ -2923,7 +2924,7 @@
           <a:p>
             <a:fld id="{C15FC8A3-6A92-4D25-A62C-09A6E434F930}" type="datetimeFigureOut">
               <a:rPr lang="en-US" smtClean="0"/>
-              <a:t>6/10/2019</a:t>
+              <a:t>6/11/2019</a:t>
             </a:fld>
             <a:endParaRPr lang="en-US"/>
           </a:p>
@@ -4612,6 +4613,101 @@
           <a:chExt cx="0" cy="0"/>
         </a:xfrm>
       </p:grpSpPr>
+      <p:pic>
+        <p:nvPicPr>
+          <p:cNvPr id="4" name="Picture 3">
+            <a:extLst>
+              <a:ext uri="{FF2B5EF4-FFF2-40B4-BE49-F238E27FC236}">
+                <a16:creationId xmlns:a16="http://schemas.microsoft.com/office/drawing/2014/main" id="{DBA0E0D6-8ACD-4C52-8203-EB8E0EFFFD05}"/>
+              </a:ext>
+            </a:extLst>
+          </p:cNvPr>
+          <p:cNvPicPr>
+            <a:picLocks noChangeAspect="1"/>
+          </p:cNvPicPr>
+          <p:nvPr/>
+        </p:nvPicPr>
+        <p:blipFill>
+          <a:blip r:embed="rId2"/>
+          <a:stretch>
+            <a:fillRect/>
+          </a:stretch>
+        </p:blipFill>
+        <p:spPr>
+          <a:xfrm>
+            <a:off x="0" y="1832776"/>
+            <a:ext cx="12192000" cy="5025224"/>
+          </a:xfrm>
+          <a:prstGeom prst="rect">
+            <a:avLst/>
+          </a:prstGeom>
+        </p:spPr>
+      </p:pic>
+      <p:sp>
+        <p:nvSpPr>
+          <p:cNvPr id="5" name="Content Placeholder 2">
+            <a:extLst>
+              <a:ext uri="{FF2B5EF4-FFF2-40B4-BE49-F238E27FC236}">
+                <a16:creationId xmlns:a16="http://schemas.microsoft.com/office/drawing/2014/main" id="{46B23046-8CC6-445C-B669-C981FBDB43BC}"/>
+              </a:ext>
+            </a:extLst>
+          </p:cNvPr>
+          <p:cNvSpPr>
+            <a:spLocks noGrp="1"/>
+          </p:cNvSpPr>
+          <p:nvPr>
+            <p:ph idx="1"/>
+          </p:nvPr>
+        </p:nvSpPr>
+        <p:spPr>
+          <a:xfrm>
+            <a:off x="157018" y="147783"/>
+            <a:ext cx="11554691" cy="1366982"/>
+          </a:xfrm>
+        </p:spPr>
+        <p:txBody>
+          <a:bodyPr>
+            <a:normAutofit/>
+          </a:bodyPr>
+          <a:lstStyle/>
+          <a:p>
+            <a:r>
+              <a:rPr lang="en-US" sz="1400" dirty="0"/>
+              <a:t>4000 episode run with reward model that employed: 1] increased negative step reward for each step after race is longer than shortest time, 2] positive reward at end of episode if new best time was set.</a:t>
+            </a:r>
+          </a:p>
+        </p:txBody>
+      </p:sp>
+    </p:spTree>
+    <p:extLst>
+      <p:ext uri="{BB962C8B-B14F-4D97-AF65-F5344CB8AC3E}">
+        <p14:creationId xmlns:p14="http://schemas.microsoft.com/office/powerpoint/2010/main" val="3734245667"/>
+      </p:ext>
+    </p:extLst>
+  </p:cSld>
+  <p:clrMapOvr>
+    <a:masterClrMapping/>
+  </p:clrMapOvr>
+</p:sld>
+</file>
+
+<file path=ppt/slides/slide16.xml><?xml version="1.0" encoding="utf-8"?>
+<p:sld xmlns:a="http://schemas.openxmlformats.org/drawingml/2006/main" xmlns:r="http://schemas.openxmlformats.org/officeDocument/2006/relationships" xmlns:p="http://schemas.openxmlformats.org/presentationml/2006/main">
+  <p:cSld>
+    <p:spTree>
+      <p:nvGrpSpPr>
+        <p:cNvPr id="1" name=""/>
+        <p:cNvGrpSpPr/>
+        <p:nvPr/>
+      </p:nvGrpSpPr>
+      <p:grpSpPr>
+        <a:xfrm>
+          <a:off x="0" y="0"/>
+          <a:ext cx="0" cy="0"/>
+          <a:chOff x="0" y="0"/>
+          <a:chExt cx="0" cy="0"/>
+        </a:xfrm>
+      </p:grpSpPr>
       <p:sp>
         <p:nvSpPr>
           <p:cNvPr id="3" name="Content Placeholder 2">

</xml_diff>

<commit_message>
improve episode number tracking and "end of session" plotting
</commit_message>
<xml_diff>
--- a/supercross_learner/supercross_project_readme.pptx
+++ b/supercross_learner/supercross_project_readme.pptx
@@ -20,7 +20,8 @@
     <p:sldId id="268" r:id="rId14"/>
     <p:sldId id="274" r:id="rId15"/>
     <p:sldId id="276" r:id="rId16"/>
-    <p:sldId id="266" r:id="rId17"/>
+    <p:sldId id="278" r:id="rId17"/>
+    <p:sldId id="266" r:id="rId18"/>
   </p:sldIdLst>
   <p:sldSz cx="12192000" cy="6858000"/>
   <p:notesSz cx="6858000" cy="9144000"/>
@@ -274,7 +275,7 @@
           <a:p>
             <a:fld id="{C15FC8A3-6A92-4D25-A62C-09A6E434F930}" type="datetimeFigureOut">
               <a:rPr lang="en-US" smtClean="0"/>
-              <a:t>6/11/2019</a:t>
+              <a:t>6/13/2019</a:t>
             </a:fld>
             <a:endParaRPr lang="en-US"/>
           </a:p>
@@ -472,7 +473,7 @@
           <a:p>
             <a:fld id="{C15FC8A3-6A92-4D25-A62C-09A6E434F930}" type="datetimeFigureOut">
               <a:rPr lang="en-US" smtClean="0"/>
-              <a:t>6/11/2019</a:t>
+              <a:t>6/13/2019</a:t>
             </a:fld>
             <a:endParaRPr lang="en-US"/>
           </a:p>
@@ -680,7 +681,7 @@
           <a:p>
             <a:fld id="{C15FC8A3-6A92-4D25-A62C-09A6E434F930}" type="datetimeFigureOut">
               <a:rPr lang="en-US" smtClean="0"/>
-              <a:t>6/11/2019</a:t>
+              <a:t>6/13/2019</a:t>
             </a:fld>
             <a:endParaRPr lang="en-US"/>
           </a:p>
@@ -878,7 +879,7 @@
           <a:p>
             <a:fld id="{C15FC8A3-6A92-4D25-A62C-09A6E434F930}" type="datetimeFigureOut">
               <a:rPr lang="en-US" smtClean="0"/>
-              <a:t>6/11/2019</a:t>
+              <a:t>6/13/2019</a:t>
             </a:fld>
             <a:endParaRPr lang="en-US"/>
           </a:p>
@@ -1153,7 +1154,7 @@
           <a:p>
             <a:fld id="{C15FC8A3-6A92-4D25-A62C-09A6E434F930}" type="datetimeFigureOut">
               <a:rPr lang="en-US" smtClean="0"/>
-              <a:t>6/11/2019</a:t>
+              <a:t>6/13/2019</a:t>
             </a:fld>
             <a:endParaRPr lang="en-US"/>
           </a:p>
@@ -1418,7 +1419,7 @@
           <a:p>
             <a:fld id="{C15FC8A3-6A92-4D25-A62C-09A6E434F930}" type="datetimeFigureOut">
               <a:rPr lang="en-US" smtClean="0"/>
-              <a:t>6/11/2019</a:t>
+              <a:t>6/13/2019</a:t>
             </a:fld>
             <a:endParaRPr lang="en-US"/>
           </a:p>
@@ -1830,7 +1831,7 @@
           <a:p>
             <a:fld id="{C15FC8A3-6A92-4D25-A62C-09A6E434F930}" type="datetimeFigureOut">
               <a:rPr lang="en-US" smtClean="0"/>
-              <a:t>6/11/2019</a:t>
+              <a:t>6/13/2019</a:t>
             </a:fld>
             <a:endParaRPr lang="en-US"/>
           </a:p>
@@ -1971,7 +1972,7 @@
           <a:p>
             <a:fld id="{C15FC8A3-6A92-4D25-A62C-09A6E434F930}" type="datetimeFigureOut">
               <a:rPr lang="en-US" smtClean="0"/>
-              <a:t>6/11/2019</a:t>
+              <a:t>6/13/2019</a:t>
             </a:fld>
             <a:endParaRPr lang="en-US"/>
           </a:p>
@@ -2084,7 +2085,7 @@
           <a:p>
             <a:fld id="{C15FC8A3-6A92-4D25-A62C-09A6E434F930}" type="datetimeFigureOut">
               <a:rPr lang="en-US" smtClean="0"/>
-              <a:t>6/11/2019</a:t>
+              <a:t>6/13/2019</a:t>
             </a:fld>
             <a:endParaRPr lang="en-US"/>
           </a:p>
@@ -2395,7 +2396,7 @@
           <a:p>
             <a:fld id="{C15FC8A3-6A92-4D25-A62C-09A6E434F930}" type="datetimeFigureOut">
               <a:rPr lang="en-US" smtClean="0"/>
-              <a:t>6/11/2019</a:t>
+              <a:t>6/13/2019</a:t>
             </a:fld>
             <a:endParaRPr lang="en-US"/>
           </a:p>
@@ -2683,7 +2684,7 @@
           <a:p>
             <a:fld id="{C15FC8A3-6A92-4D25-A62C-09A6E434F930}" type="datetimeFigureOut">
               <a:rPr lang="en-US" smtClean="0"/>
-              <a:t>6/11/2019</a:t>
+              <a:t>6/13/2019</a:t>
             </a:fld>
             <a:endParaRPr lang="en-US"/>
           </a:p>
@@ -2924,7 +2925,7 @@
           <a:p>
             <a:fld id="{C15FC8A3-6A92-4D25-A62C-09A6E434F930}" type="datetimeFigureOut">
               <a:rPr lang="en-US" smtClean="0"/>
-              <a:t>6/11/2019</a:t>
+              <a:t>6/13/2019</a:t>
             </a:fld>
             <a:endParaRPr lang="en-US"/>
           </a:p>
@@ -4710,6 +4711,213 @@
       </p:grpSpPr>
       <p:sp>
         <p:nvSpPr>
+          <p:cNvPr id="5" name="Content Placeholder 2">
+            <a:extLst>
+              <a:ext uri="{FF2B5EF4-FFF2-40B4-BE49-F238E27FC236}">
+                <a16:creationId xmlns:a16="http://schemas.microsoft.com/office/drawing/2014/main" id="{46B23046-8CC6-445C-B669-C981FBDB43BC}"/>
+              </a:ext>
+            </a:extLst>
+          </p:cNvPr>
+          <p:cNvSpPr>
+            <a:spLocks noGrp="1"/>
+          </p:cNvSpPr>
+          <p:nvPr>
+            <p:ph idx="1"/>
+          </p:nvPr>
+        </p:nvSpPr>
+        <p:spPr>
+          <a:xfrm>
+            <a:off x="157018" y="147783"/>
+            <a:ext cx="3362037" cy="6622472"/>
+          </a:xfrm>
+        </p:spPr>
+        <p:txBody>
+          <a:bodyPr>
+            <a:normAutofit/>
+          </a:bodyPr>
+          <a:lstStyle/>
+          <a:p>
+            <a:r>
+              <a:rPr lang="en-US" sz="1400" dirty="0"/>
+              <a:t>Added model saving, so that learning sessions can continue from where the last session with same model left off. The results here are from a continuation of the previous 4500 episodes. I then realized that the episode counter needed restart at the last episode from the last session, and updated it. But the issue was that the learner was so good, that it was rarely making better times, so I deleted some of the past TF checkpoints, only to learn that TF doesn’t handle that well, and it started from the beginning again.</a:t>
+            </a:r>
+          </a:p>
+          <a:p>
+            <a:r>
+              <a:rPr lang="en-US" sz="1400" dirty="0"/>
+              <a:t>Added feature to allow any number of tracks, for a learning session, and for each episode, a track is selected randomly. All race time and best times are track on a per track basis, so we can see full details of the learners progress on each track. Also, for each track, a copy of the environment is constantly updated each time a new best time is set on that track. These env copies are used to draw the race at the end of the session.</a:t>
+            </a:r>
+          </a:p>
+          <a:p>
+            <a:r>
+              <a:rPr lang="en-US" sz="1400" dirty="0"/>
+              <a:t>What is still not great is that there is no check for if this sessions is a restart, and if so, to load the best times previously set for each track. This is actually important, since we use best time of each track to control the </a:t>
+            </a:r>
+            <a:r>
+              <a:rPr lang="en-US" sz="1400"/>
+              <a:t>reward signal.</a:t>
+            </a:r>
+            <a:endParaRPr lang="en-US" sz="1400" dirty="0"/>
+          </a:p>
+        </p:txBody>
+      </p:sp>
+      <p:pic>
+        <p:nvPicPr>
+          <p:cNvPr id="2" name="Picture 1">
+            <a:extLst>
+              <a:ext uri="{FF2B5EF4-FFF2-40B4-BE49-F238E27FC236}">
+                <a16:creationId xmlns:a16="http://schemas.microsoft.com/office/drawing/2014/main" id="{BA7DC838-845A-4995-9C69-FC461D8E5BE3}"/>
+              </a:ext>
+            </a:extLst>
+          </p:cNvPr>
+          <p:cNvPicPr>
+            <a:picLocks noChangeAspect="1"/>
+          </p:cNvPicPr>
+          <p:nvPr/>
+        </p:nvPicPr>
+        <p:blipFill>
+          <a:blip r:embed="rId2"/>
+          <a:stretch>
+            <a:fillRect/>
+          </a:stretch>
+        </p:blipFill>
+        <p:spPr>
+          <a:xfrm>
+            <a:off x="3616038" y="87745"/>
+            <a:ext cx="8575962" cy="2142833"/>
+          </a:xfrm>
+          <a:prstGeom prst="rect">
+            <a:avLst/>
+          </a:prstGeom>
+        </p:spPr>
+      </p:pic>
+      <p:pic>
+        <p:nvPicPr>
+          <p:cNvPr id="3" name="Picture 2">
+            <a:extLst>
+              <a:ext uri="{FF2B5EF4-FFF2-40B4-BE49-F238E27FC236}">
+                <a16:creationId xmlns:a16="http://schemas.microsoft.com/office/drawing/2014/main" id="{BF09A9D3-6BDA-4C0E-B2B7-BF79BFD9A30E}"/>
+              </a:ext>
+            </a:extLst>
+          </p:cNvPr>
+          <p:cNvPicPr>
+            <a:picLocks noChangeAspect="1"/>
+          </p:cNvPicPr>
+          <p:nvPr/>
+        </p:nvPicPr>
+        <p:blipFill>
+          <a:blip r:embed="rId3"/>
+          <a:stretch>
+            <a:fillRect/>
+          </a:stretch>
+        </p:blipFill>
+        <p:spPr>
+          <a:xfrm>
+            <a:off x="3606901" y="2556014"/>
+            <a:ext cx="8575962" cy="2073866"/>
+          </a:xfrm>
+          <a:prstGeom prst="rect">
+            <a:avLst/>
+          </a:prstGeom>
+        </p:spPr>
+      </p:pic>
+      <p:pic>
+        <p:nvPicPr>
+          <p:cNvPr id="6" name="Picture 5">
+            <a:extLst>
+              <a:ext uri="{FF2B5EF4-FFF2-40B4-BE49-F238E27FC236}">
+                <a16:creationId xmlns:a16="http://schemas.microsoft.com/office/drawing/2014/main" id="{45C3CCF0-253F-461D-A381-44D429EBB204}"/>
+              </a:ext>
+            </a:extLst>
+          </p:cNvPr>
+          <p:cNvPicPr>
+            <a:picLocks noChangeAspect="1"/>
+          </p:cNvPicPr>
+          <p:nvPr/>
+        </p:nvPicPr>
+        <p:blipFill>
+          <a:blip r:embed="rId4"/>
+          <a:stretch>
+            <a:fillRect/>
+          </a:stretch>
+        </p:blipFill>
+        <p:spPr>
+          <a:xfrm>
+            <a:off x="3606901" y="4627422"/>
+            <a:ext cx="8585099" cy="2142833"/>
+          </a:xfrm>
+          <a:prstGeom prst="rect">
+            <a:avLst/>
+          </a:prstGeom>
+        </p:spPr>
+      </p:pic>
+      <p:sp>
+        <p:nvSpPr>
+          <p:cNvPr id="7" name="TextBox 6">
+            <a:extLst>
+              <a:ext uri="{FF2B5EF4-FFF2-40B4-BE49-F238E27FC236}">
+                <a16:creationId xmlns:a16="http://schemas.microsoft.com/office/drawing/2014/main" id="{F6DD843A-66F8-4859-9B7A-10E5584D7D26}"/>
+              </a:ext>
+            </a:extLst>
+          </p:cNvPr>
+          <p:cNvSpPr txBox="1"/>
+          <p:nvPr/>
+        </p:nvSpPr>
+        <p:spPr>
+          <a:xfrm>
+            <a:off x="4045527" y="2230578"/>
+            <a:ext cx="7717818" cy="338554"/>
+          </a:xfrm>
+          <a:prstGeom prst="rect">
+            <a:avLst/>
+          </a:prstGeom>
+          <a:noFill/>
+        </p:spPr>
+        <p:txBody>
+          <a:bodyPr wrap="none" rtlCol="0">
+            <a:spAutoFit/>
+          </a:bodyPr>
+          <a:lstStyle/>
+          <a:p>
+            <a:r>
+              <a:rPr lang="en-US" sz="1600" dirty="0"/>
+              <a:t>Above: before TF checkpoints was wiped. Below, consecutive 100 ep runs with better plots</a:t>
+            </a:r>
+          </a:p>
+        </p:txBody>
+      </p:sp>
+    </p:spTree>
+    <p:extLst>
+      <p:ext uri="{BB962C8B-B14F-4D97-AF65-F5344CB8AC3E}">
+        <p14:creationId xmlns:p14="http://schemas.microsoft.com/office/powerpoint/2010/main" val="1549548764"/>
+      </p:ext>
+    </p:extLst>
+  </p:cSld>
+  <p:clrMapOvr>
+    <a:masterClrMapping/>
+  </p:clrMapOvr>
+</p:sld>
+</file>
+
+<file path=ppt/slides/slide17.xml><?xml version="1.0" encoding="utf-8"?>
+<p:sld xmlns:a="http://schemas.openxmlformats.org/drawingml/2006/main" xmlns:r="http://schemas.openxmlformats.org/officeDocument/2006/relationships" xmlns:p="http://schemas.openxmlformats.org/presentationml/2006/main">
+  <p:cSld>
+    <p:spTree>
+      <p:nvGrpSpPr>
+        <p:cNvPr id="1" name=""/>
+        <p:cNvGrpSpPr/>
+        <p:nvPr/>
+      </p:nvGrpSpPr>
+      <p:grpSpPr>
+        <a:xfrm>
+          <a:off x="0" y="0"/>
+          <a:ext cx="0" cy="0"/>
+          <a:chOff x="0" y="0"/>
+          <a:chExt cx="0" cy="0"/>
+        </a:xfrm>
+      </p:grpSpPr>
+      <p:sp>
+        <p:nvSpPr>
           <p:cNvPr id="3" name="Content Placeholder 2">
             <a:extLst>
               <a:ext uri="{FF2B5EF4-FFF2-40B4-BE49-F238E27FC236}">

</xml_diff>